<commit_message>
adding Meetingsummary document and adding Gameobject BandageGuy
</commit_message>
<xml_diff>
--- a/src/docs/Think_Outside_The_Room.pptx
+++ b/src/docs/Think_Outside_The_Room.pptx
@@ -219,7 +219,7 @@
           <a:p>
             <a:fld id="{AB6CE768-00B0-484D-88B6-55443FF83DC7}" type="datetimeFigureOut">
               <a:rPr lang="de-CH" smtClean="0"/>
-              <a:t>05.03.2025</a:t>
+              <a:t>06.03.2025</a:t>
             </a:fld>
             <a:endParaRPr lang="de-CH"/>
           </a:p>
@@ -492,13 +492,7 @@
   <p:cSld>
     <p:spTree>
       <p:nvGrpSpPr>
-        <p:cNvPr id="1" name="">
-          <a:extLst>
-            <a:ext uri="{FF2B5EF4-FFF2-40B4-BE49-F238E27FC236}">
-              <a16:creationId xmlns:a16="http://schemas.microsoft.com/office/drawing/2014/main" id="{BEB277A2-4A97-A02D-E381-8C2B2FACA6BB}"/>
-            </a:ext>
-          </a:extLst>
-        </p:cNvPr>
+        <p:cNvPr id="1" name=""/>
         <p:cNvGrpSpPr/>
         <p:nvPr/>
       </p:nvGrpSpPr>
@@ -512,13 +506,7 @@
       </p:grpSpPr>
       <p:sp>
         <p:nvSpPr>
-          <p:cNvPr id="2" name="Slide Image Placeholder 1">
-            <a:extLst>
-              <a:ext uri="{FF2B5EF4-FFF2-40B4-BE49-F238E27FC236}">
-                <a16:creationId xmlns:a16="http://schemas.microsoft.com/office/drawing/2014/main" id="{666C7512-1C29-713B-CEE9-59443B8173BA}"/>
-              </a:ext>
-            </a:extLst>
-          </p:cNvPr>
+          <p:cNvPr id="2" name="Folienbildplatzhalter 1"/>
           <p:cNvSpPr>
             <a:spLocks noGrp="1" noRot="1" noChangeAspect="1"/>
           </p:cNvSpPr>
@@ -530,13 +518,7 @@
       </p:sp>
       <p:sp>
         <p:nvSpPr>
-          <p:cNvPr id="3" name="Notes Placeholder 2">
-            <a:extLst>
-              <a:ext uri="{FF2B5EF4-FFF2-40B4-BE49-F238E27FC236}">
-                <a16:creationId xmlns:a16="http://schemas.microsoft.com/office/drawing/2014/main" id="{FB14D769-008A-F801-C2C8-1DEAA668301A}"/>
-              </a:ext>
-            </a:extLst>
-          </p:cNvPr>
+          <p:cNvPr id="3" name="Notizenplatzhalter 2"/>
           <p:cNvSpPr>
             <a:spLocks noGrp="1"/>
           </p:cNvSpPr>
@@ -555,13 +537,7 @@
       </p:sp>
       <p:sp>
         <p:nvSpPr>
-          <p:cNvPr id="4" name="Slide Number Placeholder 3">
-            <a:extLst>
-              <a:ext uri="{FF2B5EF4-FFF2-40B4-BE49-F238E27FC236}">
-                <a16:creationId xmlns:a16="http://schemas.microsoft.com/office/drawing/2014/main" id="{695EE81C-69CE-E8FD-9792-FF6740D04FDD}"/>
-              </a:ext>
-            </a:extLst>
-          </p:cNvPr>
+          <p:cNvPr id="4" name="Foliennummernplatzhalter 3"/>
           <p:cNvSpPr>
             <a:spLocks noGrp="1"/>
           </p:cNvSpPr>
@@ -576,7 +552,7 @@
           <a:p>
             <a:fld id="{D3601A89-DBFB-4F6A-83EE-ADE86D57FE12}" type="slidenum">
               <a:rPr lang="de-CH" smtClean="0"/>
-              <a:t>2</a:t>
+              <a:t>1</a:t>
             </a:fld>
             <a:endParaRPr lang="de-CH"/>
           </a:p>
@@ -585,7 +561,7 @@
     </p:spTree>
     <p:extLst>
       <p:ext uri="{BB962C8B-B14F-4D97-AF65-F5344CB8AC3E}">
-        <p14:creationId xmlns:p14="http://schemas.microsoft.com/office/powerpoint/2010/main" val="1225033106"/>
+        <p14:creationId xmlns:p14="http://schemas.microsoft.com/office/powerpoint/2010/main" val="4175066063"/>
       </p:ext>
     </p:extLst>
   </p:cSld>
@@ -595,7 +571,91 @@
 </p:notes>
 </file>
 
-<file path=ppt/notesSlides/notesSlide2.xml><?xml version="1.0" encoding="utf-8"?>
+<file path=ppt/notesSlides/notesSlide10.xml><?xml version="1.0" encoding="utf-8"?>
+<p:notes xmlns:a="http://schemas.openxmlformats.org/drawingml/2006/main" xmlns:r="http://schemas.openxmlformats.org/officeDocument/2006/relationships" xmlns:p="http://schemas.openxmlformats.org/presentationml/2006/main">
+  <p:cSld>
+    <p:spTree>
+      <p:nvGrpSpPr>
+        <p:cNvPr id="1" name=""/>
+        <p:cNvGrpSpPr/>
+        <p:nvPr/>
+      </p:nvGrpSpPr>
+      <p:grpSpPr>
+        <a:xfrm>
+          <a:off x="0" y="0"/>
+          <a:ext cx="0" cy="0"/>
+          <a:chOff x="0" y="0"/>
+          <a:chExt cx="0" cy="0"/>
+        </a:xfrm>
+      </p:grpSpPr>
+      <p:sp>
+        <p:nvSpPr>
+          <p:cNvPr id="2" name="Folienbildplatzhalter 1"/>
+          <p:cNvSpPr>
+            <a:spLocks noGrp="1" noRot="1" noChangeAspect="1"/>
+          </p:cNvSpPr>
+          <p:nvPr>
+            <p:ph type="sldImg"/>
+          </p:nvPr>
+        </p:nvSpPr>
+        <p:spPr/>
+      </p:sp>
+      <p:sp>
+        <p:nvSpPr>
+          <p:cNvPr id="3" name="Notizenplatzhalter 2"/>
+          <p:cNvSpPr>
+            <a:spLocks noGrp="1"/>
+          </p:cNvSpPr>
+          <p:nvPr>
+            <p:ph type="body" idx="1"/>
+          </p:nvPr>
+        </p:nvSpPr>
+        <p:spPr/>
+        <p:txBody>
+          <a:bodyPr/>
+          <a:lstStyle/>
+          <a:p>
+            <a:endParaRPr lang="de-CH"/>
+          </a:p>
+        </p:txBody>
+      </p:sp>
+      <p:sp>
+        <p:nvSpPr>
+          <p:cNvPr id="4" name="Foliennummernplatzhalter 3"/>
+          <p:cNvSpPr>
+            <a:spLocks noGrp="1"/>
+          </p:cNvSpPr>
+          <p:nvPr>
+            <p:ph type="sldNum" sz="quarter" idx="5"/>
+          </p:nvPr>
+        </p:nvSpPr>
+        <p:spPr/>
+        <p:txBody>
+          <a:bodyPr/>
+          <a:lstStyle/>
+          <a:p>
+            <a:fld id="{D3601A89-DBFB-4F6A-83EE-ADE86D57FE12}" type="slidenum">
+              <a:rPr lang="de-CH" smtClean="0"/>
+              <a:t>12</a:t>
+            </a:fld>
+            <a:endParaRPr lang="de-CH"/>
+          </a:p>
+        </p:txBody>
+      </p:sp>
+    </p:spTree>
+    <p:extLst>
+      <p:ext uri="{BB962C8B-B14F-4D97-AF65-F5344CB8AC3E}">
+        <p14:creationId xmlns:p14="http://schemas.microsoft.com/office/powerpoint/2010/main" val="2302575546"/>
+      </p:ext>
+    </p:extLst>
+  </p:cSld>
+  <p:clrMapOvr>
+    <a:masterClrMapping/>
+  </p:clrMapOvr>
+</p:notes>
+</file>
+
+<file path=ppt/notesSlides/notesSlide11.xml><?xml version="1.0" encoding="utf-8"?>
 <p:notes xmlns:a="http://schemas.openxmlformats.org/drawingml/2006/main" xmlns:r="http://schemas.openxmlformats.org/officeDocument/2006/relationships" xmlns:p="http://schemas.openxmlformats.org/presentationml/2006/main">
   <p:cSld>
     <p:spTree>
@@ -639,7 +699,7 @@
           <a:bodyPr/>
           <a:lstStyle/>
           <a:p>
-            <a:endParaRPr lang="de-CH" dirty="0"/>
+            <a:endParaRPr lang="de-CH"/>
           </a:p>
         </p:txBody>
       </p:sp>
@@ -660,7 +720,7 @@
           <a:p>
             <a:fld id="{D3601A89-DBFB-4F6A-83EE-ADE86D57FE12}" type="slidenum">
               <a:rPr lang="de-CH" smtClean="0"/>
-              <a:t>3</a:t>
+              <a:t>13</a:t>
             </a:fld>
             <a:endParaRPr lang="de-CH"/>
           </a:p>
@@ -669,7 +729,7 @@
     </p:spTree>
     <p:extLst>
       <p:ext uri="{BB962C8B-B14F-4D97-AF65-F5344CB8AC3E}">
-        <p14:creationId xmlns:p14="http://schemas.microsoft.com/office/powerpoint/2010/main" val="2336080979"/>
+        <p14:creationId xmlns:p14="http://schemas.microsoft.com/office/powerpoint/2010/main" val="813683188"/>
       </p:ext>
     </p:extLst>
   </p:cSld>
@@ -679,7 +739,7 @@
 </p:notes>
 </file>
 
-<file path=ppt/notesSlides/notesSlide3.xml><?xml version="1.0" encoding="utf-8"?>
+<file path=ppt/notesSlides/notesSlide2.xml><?xml version="1.0" encoding="utf-8"?>
 <p:notes xmlns:a="http://schemas.openxmlformats.org/drawingml/2006/main" xmlns:r="http://schemas.openxmlformats.org/officeDocument/2006/relationships" xmlns:p="http://schemas.openxmlformats.org/presentationml/2006/main">
   <p:cSld>
     <p:spTree>
@@ -687,7 +747,7 @@
         <p:cNvPr id="1" name="">
           <a:extLst>
             <a:ext uri="{FF2B5EF4-FFF2-40B4-BE49-F238E27FC236}">
-              <a16:creationId xmlns:a16="http://schemas.microsoft.com/office/drawing/2014/main" id="{FC5B8DB9-DE93-68F6-3022-E1D325037EDA}"/>
+              <a16:creationId xmlns:a16="http://schemas.microsoft.com/office/drawing/2014/main" id="{BEB277A2-4A97-A02D-E381-8C2B2FACA6BB}"/>
             </a:ext>
           </a:extLst>
         </p:cNvPr>
@@ -707,7 +767,7 @@
           <p:cNvPr id="2" name="Slide Image Placeholder 1">
             <a:extLst>
               <a:ext uri="{FF2B5EF4-FFF2-40B4-BE49-F238E27FC236}">
-                <a16:creationId xmlns:a16="http://schemas.microsoft.com/office/drawing/2014/main" id="{F5C7C335-4851-9917-2CFB-016414BF5C4D}"/>
+                <a16:creationId xmlns:a16="http://schemas.microsoft.com/office/drawing/2014/main" id="{666C7512-1C29-713B-CEE9-59443B8173BA}"/>
               </a:ext>
             </a:extLst>
           </p:cNvPr>
@@ -725,7 +785,7 @@
           <p:cNvPr id="3" name="Notes Placeholder 2">
             <a:extLst>
               <a:ext uri="{FF2B5EF4-FFF2-40B4-BE49-F238E27FC236}">
-                <a16:creationId xmlns:a16="http://schemas.microsoft.com/office/drawing/2014/main" id="{87934621-4A75-451E-10F6-098C20415BBF}"/>
+                <a16:creationId xmlns:a16="http://schemas.microsoft.com/office/drawing/2014/main" id="{FB14D769-008A-F801-C2C8-1DEAA668301A}"/>
               </a:ext>
             </a:extLst>
           </p:cNvPr>
@@ -741,61 +801,6 @@
           <a:bodyPr/>
           <a:lstStyle/>
           <a:p>
-            <a:r>
-              <a:rPr lang="en-US"/>
-              <a:t>Our game is built using </a:t>
-            </a:r>
-            <a:r>
-              <a:rPr lang="en-US" b="1"/>
-              <a:t>Java 21</a:t>
-            </a:r>
-            <a:r>
-              <a:rPr lang="en-US"/>
-              <a:t> and relies on a </a:t>
-            </a:r>
-            <a:r>
-              <a:rPr lang="en-US" b="1"/>
-              <a:t>text-based network protocol</a:t>
-            </a:r>
-            <a:r>
-              <a:rPr lang="en-US"/>
-              <a:t> for efficient communication. It is optimized for </a:t>
-            </a:r>
-            <a:r>
-              <a:rPr lang="en-US" b="1"/>
-              <a:t>standard hardware</a:t>
-            </a:r>
-            <a:r>
-              <a:rPr lang="en-US"/>
-              <a:t> and runs within a </a:t>
-            </a:r>
-            <a:r>
-              <a:rPr lang="en-US" b="1"/>
-              <a:t>university-controlled network</a:t>
-            </a:r>
-            <a:r>
-              <a:rPr lang="en-US"/>
-              <a:t>. Security is a top priority, with </a:t>
-            </a:r>
-            <a:r>
-              <a:rPr lang="en-US" b="1"/>
-              <a:t>encrypted authentication and communication</a:t>
-            </a:r>
-            <a:r>
-              <a:rPr lang="en-US"/>
-              <a:t> ensuring a safe multiplayer experience.</a:t>
-            </a:r>
-            <a:br>
-              <a:rPr lang="en-US"/>
-            </a:br>
-            <a:br>
-              <a:rPr lang="en-US"/>
-            </a:br>
-            <a:br>
-              <a:rPr lang="de-CH">
-                <a:cs typeface="+mn-lt"/>
-              </a:rPr>
-            </a:br>
             <a:endParaRPr lang="de-CH"/>
           </a:p>
         </p:txBody>
@@ -805,7 +810,7 @@
           <p:cNvPr id="4" name="Slide Number Placeholder 3">
             <a:extLst>
               <a:ext uri="{FF2B5EF4-FFF2-40B4-BE49-F238E27FC236}">
-                <a16:creationId xmlns:a16="http://schemas.microsoft.com/office/drawing/2014/main" id="{B2ED74A9-2556-BF13-8B2B-483B00DB2AFB}"/>
+                <a16:creationId xmlns:a16="http://schemas.microsoft.com/office/drawing/2014/main" id="{695EE81C-69CE-E8FD-9792-FF6740D04FDD}"/>
               </a:ext>
             </a:extLst>
           </p:cNvPr>
@@ -823,7 +828,7 @@
           <a:p>
             <a:fld id="{D3601A89-DBFB-4F6A-83EE-ADE86D57FE12}" type="slidenum">
               <a:rPr lang="de-CH" smtClean="0"/>
-              <a:t>7</a:t>
+              <a:t>2</a:t>
             </a:fld>
             <a:endParaRPr lang="de-CH"/>
           </a:p>
@@ -832,7 +837,7 @@
     </p:spTree>
     <p:extLst>
       <p:ext uri="{BB962C8B-B14F-4D97-AF65-F5344CB8AC3E}">
-        <p14:creationId xmlns:p14="http://schemas.microsoft.com/office/powerpoint/2010/main" val="606904964"/>
+        <p14:creationId xmlns:p14="http://schemas.microsoft.com/office/powerpoint/2010/main" val="1225033106"/>
       </p:ext>
     </p:extLst>
   </p:cSld>
@@ -842,732 +847,7 @@
 </p:notes>
 </file>
 
-<file path=ppt/notesSlides/notesSlide4.xml><?xml version="1.0" encoding="utf-8"?>
-<p:notes xmlns:a="http://schemas.openxmlformats.org/drawingml/2006/main" xmlns:r="http://schemas.openxmlformats.org/officeDocument/2006/relationships" xmlns:p="http://schemas.openxmlformats.org/presentationml/2006/main">
-  <p:cSld>
-    <p:spTree>
-      <p:nvGrpSpPr>
-        <p:cNvPr id="1" name="">
-          <a:extLst>
-            <a:ext uri="{FF2B5EF4-FFF2-40B4-BE49-F238E27FC236}">
-              <a16:creationId xmlns:a16="http://schemas.microsoft.com/office/drawing/2014/main" id="{7F81AE97-965F-67BB-B262-2E5EACCA2E60}"/>
-            </a:ext>
-          </a:extLst>
-        </p:cNvPr>
-        <p:cNvGrpSpPr/>
-        <p:nvPr/>
-      </p:nvGrpSpPr>
-      <p:grpSpPr>
-        <a:xfrm>
-          <a:off x="0" y="0"/>
-          <a:ext cx="0" cy="0"/>
-          <a:chOff x="0" y="0"/>
-          <a:chExt cx="0" cy="0"/>
-        </a:xfrm>
-      </p:grpSpPr>
-      <p:sp>
-        <p:nvSpPr>
-          <p:cNvPr id="2" name="Slide Image Placeholder 1">
-            <a:extLst>
-              <a:ext uri="{FF2B5EF4-FFF2-40B4-BE49-F238E27FC236}">
-                <a16:creationId xmlns:a16="http://schemas.microsoft.com/office/drawing/2014/main" id="{F280889D-0C95-9586-8386-F81A89FA7245}"/>
-              </a:ext>
-            </a:extLst>
-          </p:cNvPr>
-          <p:cNvSpPr>
-            <a:spLocks noGrp="1" noRot="1" noChangeAspect="1"/>
-          </p:cNvSpPr>
-          <p:nvPr>
-            <p:ph type="sldImg"/>
-          </p:nvPr>
-        </p:nvSpPr>
-        <p:spPr/>
-      </p:sp>
-      <p:sp>
-        <p:nvSpPr>
-          <p:cNvPr id="3" name="Notes Placeholder 2">
-            <a:extLst>
-              <a:ext uri="{FF2B5EF4-FFF2-40B4-BE49-F238E27FC236}">
-                <a16:creationId xmlns:a16="http://schemas.microsoft.com/office/drawing/2014/main" id="{9A17D9B8-C6A4-40AE-2AE4-9EFAA34EDCF6}"/>
-              </a:ext>
-            </a:extLst>
-          </p:cNvPr>
-          <p:cNvSpPr>
-            <a:spLocks noGrp="1"/>
-          </p:cNvSpPr>
-          <p:nvPr>
-            <p:ph type="body" idx="1"/>
-          </p:nvPr>
-        </p:nvSpPr>
-        <p:spPr/>
-        <p:txBody>
-          <a:bodyPr/>
-          <a:lstStyle/>
-          <a:p>
-            <a:r>
-              <a:rPr lang="en-US"/>
-              <a:t>To ensure a seamless and immersive gaming experience, our system is built on the following core functionalities:</a:t>
-            </a:r>
-          </a:p>
-          <a:p>
-            <a:r>
-              <a:rPr lang="en-US"/>
-              <a:t>🎯 </a:t>
-            </a:r>
-            <a:r>
-              <a:rPr lang="en-US" b="1"/>
-              <a:t>Robust Client-Server Architecture</a:t>
-            </a:r>
-            <a:r>
-              <a:rPr lang="en-US"/>
-              <a:t> </a:t>
-            </a:r>
-            <a:r>
-              <a:rPr lang="en-US" i="1"/>
-              <a:t>(F10)</a:t>
-            </a:r>
-            <a:br>
-              <a:rPr lang="en-US"/>
-            </a:br>
-            <a:r>
-              <a:rPr lang="en-US"/>
-              <a:t>A custom-built </a:t>
-            </a:r>
-            <a:r>
-              <a:rPr lang="en-US" b="1"/>
-              <a:t>client-server connection</a:t>
-            </a:r>
-            <a:r>
-              <a:rPr lang="en-US"/>
-              <a:t> with an optimized </a:t>
-            </a:r>
-            <a:r>
-              <a:rPr lang="en-US" b="1"/>
-              <a:t>text-based protocol</a:t>
-            </a:r>
-            <a:r>
-              <a:rPr lang="en-US"/>
-              <a:t> ensures efficient communication and real-time responsiveness.</a:t>
-            </a:r>
-          </a:p>
-          <a:p>
-            <a:r>
-              <a:rPr lang="en-US"/>
-              <a:t>🔑 </a:t>
-            </a:r>
-            <a:r>
-              <a:rPr lang="en-US" b="1"/>
-              <a:t>User Authentication &amp; Lobby System</a:t>
-            </a:r>
-            <a:r>
-              <a:rPr lang="en-US"/>
-              <a:t> </a:t>
-            </a:r>
-            <a:r>
-              <a:rPr lang="en-US" i="1"/>
-              <a:t>(F11)</a:t>
-            </a:r>
-            <a:br>
-              <a:rPr lang="en-US"/>
-            </a:br>
-            <a:r>
-              <a:rPr lang="en-US"/>
-              <a:t>Players can securely log in and join </a:t>
-            </a:r>
-            <a:r>
-              <a:rPr lang="en-US" b="1"/>
-              <a:t>game lobbies</a:t>
-            </a:r>
-            <a:r>
-              <a:rPr lang="en-US"/>
-              <a:t>, allowing smooth matchmaking and session management.</a:t>
-            </a:r>
-          </a:p>
-          <a:p>
-            <a:r>
-              <a:rPr lang="en-US"/>
-              <a:t>⚡ </a:t>
-            </a:r>
-            <a:r>
-              <a:rPr lang="en-US" b="1"/>
-              <a:t>Real-Time Gameplay Synchronization</a:t>
-            </a:r>
-            <a:r>
-              <a:rPr lang="en-US"/>
-              <a:t> </a:t>
-            </a:r>
-            <a:r>
-              <a:rPr lang="en-US" i="1"/>
-              <a:t>(F20)</a:t>
-            </a:r>
-            <a:br>
-              <a:rPr lang="en-US"/>
-            </a:br>
-            <a:r>
-              <a:rPr lang="en-US"/>
-              <a:t>Every action is transmitted with minimal latency, ensuring a fluid and responsive </a:t>
-            </a:r>
-            <a:r>
-              <a:rPr lang="en-US" b="1"/>
-              <a:t>multiplayer experience</a:t>
-            </a:r>
-            <a:r>
-              <a:rPr lang="en-US"/>
-              <a:t>.</a:t>
-            </a:r>
-          </a:p>
-          <a:p>
-            <a:r>
-              <a:rPr lang="en-US"/>
-              <a:t>🎮 </a:t>
-            </a:r>
-            <a:r>
-              <a:rPr lang="en-US" b="1"/>
-              <a:t>Role-Specific Actions for Escapers</a:t>
-            </a:r>
-            <a:r>
-              <a:rPr lang="en-US"/>
-              <a:t> </a:t>
-            </a:r>
-            <a:r>
-              <a:rPr lang="en-US" i="1"/>
-              <a:t>(F21)</a:t>
-            </a:r>
-            <a:br>
-              <a:rPr lang="en-US"/>
-            </a:br>
-            <a:r>
-              <a:rPr lang="en-US"/>
-              <a:t>Each player controlling the </a:t>
-            </a:r>
-            <a:r>
-              <a:rPr lang="en-US" b="1"/>
-              <a:t>Escaper</a:t>
-            </a:r>
-            <a:r>
-              <a:rPr lang="en-US"/>
-              <a:t> has a unique role—requiring precise coordination to navigate the game successfully.</a:t>
-            </a:r>
-          </a:p>
-          <a:p>
-            <a:r>
-              <a:rPr lang="en-US"/>
-              <a:t>📷 </a:t>
-            </a:r>
-            <a:r>
-              <a:rPr lang="en-US" b="1"/>
-              <a:t>Dynamic Camera System</a:t>
-            </a:r>
-            <a:r>
-              <a:rPr lang="en-US"/>
-              <a:t> </a:t>
-            </a:r>
-            <a:r>
-              <a:rPr lang="en-US" i="1"/>
-              <a:t>(F22)</a:t>
-            </a:r>
-            <a:br>
-              <a:rPr lang="en-US"/>
-            </a:br>
-            <a:r>
-              <a:rPr lang="en-US"/>
-              <a:t>A smart, </a:t>
-            </a:r>
-            <a:r>
-              <a:rPr lang="en-US" b="1"/>
-              <a:t>adaptive camera system</a:t>
-            </a:r>
-            <a:r>
-              <a:rPr lang="en-US"/>
-              <a:t> keeps the action in focus, enhancing the player experience by ensuring visibility of critical gameplay elements.</a:t>
-            </a:r>
-          </a:p>
-          <a:p>
-            <a:r>
-              <a:rPr lang="en-US"/>
-              <a:t>🏆 </a:t>
-            </a:r>
-            <a:r>
-              <a:rPr lang="en-US" b="1"/>
-              <a:t>Game State Management</a:t>
-            </a:r>
-            <a:r>
-              <a:rPr lang="en-US"/>
-              <a:t> </a:t>
-            </a:r>
-            <a:r>
-              <a:rPr lang="en-US" i="1"/>
-              <a:t>(F30)</a:t>
-            </a:r>
-            <a:br>
-              <a:rPr lang="en-US"/>
-            </a:br>
-            <a:r>
-              <a:rPr lang="en-US"/>
-              <a:t>Real-time handling of </a:t>
-            </a:r>
-            <a:r>
-              <a:rPr lang="en-US" b="1"/>
-              <a:t>collisions, win/loss conditions, and state persistence</a:t>
-            </a:r>
-            <a:r>
-              <a:rPr lang="en-US"/>
-              <a:t> ensures fair and accurate game mechanics.</a:t>
-            </a:r>
-          </a:p>
-          <a:p>
-            <a:r>
-              <a:rPr lang="en-US"/>
-              <a:t>💬 </a:t>
-            </a:r>
-            <a:r>
-              <a:rPr lang="en-US" b="1"/>
-              <a:t>In-Game &amp; Lobby Chat Support</a:t>
-            </a:r>
-            <a:r>
-              <a:rPr lang="en-US"/>
-              <a:t> </a:t>
-            </a:r>
-            <a:r>
-              <a:rPr lang="en-US" i="1"/>
-              <a:t>(F40)</a:t>
-            </a:r>
-            <a:br>
-              <a:rPr lang="en-US"/>
-            </a:br>
-            <a:r>
-              <a:rPr lang="en-US"/>
-              <a:t>A built-in </a:t>
-            </a:r>
-            <a:r>
-              <a:rPr lang="en-US" b="1"/>
-              <a:t>communication system</a:t>
-            </a:r>
-            <a:r>
-              <a:rPr lang="en-US"/>
-              <a:t> allows players to strategize before and during the game, fostering teamwork and interaction.</a:t>
-            </a:r>
-          </a:p>
-          <a:p>
-            <a:br>
-              <a:rPr lang="de-CH">
-                <a:cs typeface="+mn-lt"/>
-              </a:rPr>
-            </a:br>
-            <a:endParaRPr lang="de-CH"/>
-          </a:p>
-        </p:txBody>
-      </p:sp>
-      <p:sp>
-        <p:nvSpPr>
-          <p:cNvPr id="4" name="Slide Number Placeholder 3">
-            <a:extLst>
-              <a:ext uri="{FF2B5EF4-FFF2-40B4-BE49-F238E27FC236}">
-                <a16:creationId xmlns:a16="http://schemas.microsoft.com/office/drawing/2014/main" id="{50E0A62D-B38E-744B-8827-AE824D67EEA3}"/>
-              </a:ext>
-            </a:extLst>
-          </p:cNvPr>
-          <p:cNvSpPr>
-            <a:spLocks noGrp="1"/>
-          </p:cNvSpPr>
-          <p:nvPr>
-            <p:ph type="sldNum" sz="quarter" idx="5"/>
-          </p:nvPr>
-        </p:nvSpPr>
-        <p:spPr/>
-        <p:txBody>
-          <a:bodyPr/>
-          <a:lstStyle/>
-          <a:p>
-            <a:fld id="{D3601A89-DBFB-4F6A-83EE-ADE86D57FE12}" type="slidenum">
-              <a:rPr lang="de-CH" smtClean="0"/>
-              <a:t>8</a:t>
-            </a:fld>
-            <a:endParaRPr lang="de-CH"/>
-          </a:p>
-        </p:txBody>
-      </p:sp>
-    </p:spTree>
-    <p:extLst>
-      <p:ext uri="{BB962C8B-B14F-4D97-AF65-F5344CB8AC3E}">
-        <p14:creationId xmlns:p14="http://schemas.microsoft.com/office/powerpoint/2010/main" val="3349573953"/>
-      </p:ext>
-    </p:extLst>
-  </p:cSld>
-  <p:clrMapOvr>
-    <a:masterClrMapping/>
-  </p:clrMapOvr>
-</p:notes>
-</file>
-
-<file path=ppt/notesSlides/notesSlide5.xml><?xml version="1.0" encoding="utf-8"?>
-<p:notes xmlns:a="http://schemas.openxmlformats.org/drawingml/2006/main" xmlns:r="http://schemas.openxmlformats.org/officeDocument/2006/relationships" xmlns:p="http://schemas.openxmlformats.org/presentationml/2006/main">
-  <p:cSld>
-    <p:spTree>
-      <p:nvGrpSpPr>
-        <p:cNvPr id="1" name="">
-          <a:extLst>
-            <a:ext uri="{FF2B5EF4-FFF2-40B4-BE49-F238E27FC236}">
-              <a16:creationId xmlns:a16="http://schemas.microsoft.com/office/drawing/2014/main" id="{3CC54AAC-948B-C7A8-EBC9-01610305BB2A}"/>
-            </a:ext>
-          </a:extLst>
-        </p:cNvPr>
-        <p:cNvGrpSpPr/>
-        <p:nvPr/>
-      </p:nvGrpSpPr>
-      <p:grpSpPr>
-        <a:xfrm>
-          <a:off x="0" y="0"/>
-          <a:ext cx="0" cy="0"/>
-          <a:chOff x="0" y="0"/>
-          <a:chExt cx="0" cy="0"/>
-        </a:xfrm>
-      </p:grpSpPr>
-      <p:sp>
-        <p:nvSpPr>
-          <p:cNvPr id="2" name="Slide Image Placeholder 1">
-            <a:extLst>
-              <a:ext uri="{FF2B5EF4-FFF2-40B4-BE49-F238E27FC236}">
-                <a16:creationId xmlns:a16="http://schemas.microsoft.com/office/drawing/2014/main" id="{F9B37990-017B-A261-9BCA-36EBC0033F46}"/>
-              </a:ext>
-            </a:extLst>
-          </p:cNvPr>
-          <p:cNvSpPr>
-            <a:spLocks noGrp="1" noRot="1" noChangeAspect="1"/>
-          </p:cNvSpPr>
-          <p:nvPr>
-            <p:ph type="sldImg"/>
-          </p:nvPr>
-        </p:nvSpPr>
-        <p:spPr/>
-      </p:sp>
-      <p:sp>
-        <p:nvSpPr>
-          <p:cNvPr id="3" name="Notes Placeholder 2">
-            <a:extLst>
-              <a:ext uri="{FF2B5EF4-FFF2-40B4-BE49-F238E27FC236}">
-                <a16:creationId xmlns:a16="http://schemas.microsoft.com/office/drawing/2014/main" id="{7160FA7D-F8BB-C989-7ABA-8622FAD327B7}"/>
-              </a:ext>
-            </a:extLst>
-          </p:cNvPr>
-          <p:cNvSpPr>
-            <a:spLocks noGrp="1"/>
-          </p:cNvSpPr>
-          <p:nvPr>
-            <p:ph type="body" idx="1"/>
-          </p:nvPr>
-        </p:nvSpPr>
-        <p:spPr/>
-        <p:txBody>
-          <a:bodyPr/>
-          <a:lstStyle/>
-          <a:p>
-            <a:r>
-              <a:rPr lang="de-DE"/>
-              <a:t>Neben den funktionalen Aspekten muss unser System auch </a:t>
-            </a:r>
-            <a:r>
-              <a:rPr lang="de-DE" b="1"/>
-              <a:t>technische und leistungsbezogene Anforderungen</a:t>
-            </a:r>
-            <a:r>
-              <a:rPr lang="de-DE"/>
-              <a:t> erfüllen, um ein reibungsloses und sicheres Spielerlebnis zu garantieren:</a:t>
-            </a:r>
-          </a:p>
-          <a:p>
-            <a:r>
-              <a:rPr lang="de-DE"/>
-              <a:t>🚀 </a:t>
-            </a:r>
-            <a:r>
-              <a:rPr lang="de-DE" b="1"/>
-              <a:t>Smooth Performance – 30 FPS </a:t>
-            </a:r>
-            <a:r>
-              <a:rPr lang="de-DE" b="1" err="1"/>
-              <a:t>Stability</a:t>
-            </a:r>
-            <a:br>
-              <a:rPr lang="de-DE"/>
-            </a:br>
-            <a:r>
-              <a:rPr lang="de-DE"/>
-              <a:t>Unser Spiel ist für </a:t>
-            </a:r>
-            <a:r>
-              <a:rPr lang="de-DE" b="1"/>
-              <a:t>flüssige 30 FPS</a:t>
-            </a:r>
-            <a:r>
-              <a:rPr lang="de-DE"/>
-              <a:t> optimiert, um ein konsistentes und reaktionsschnelles Spielerlebnis zu gewährleisten.</a:t>
-            </a:r>
-          </a:p>
-          <a:p>
-            <a:r>
-              <a:rPr lang="de-DE"/>
-              <a:t>📈 </a:t>
-            </a:r>
-            <a:r>
-              <a:rPr lang="de-DE" b="1" err="1"/>
-              <a:t>Scalability</a:t>
-            </a:r>
-            <a:r>
-              <a:rPr lang="de-DE" b="1"/>
-              <a:t> </a:t>
-            </a:r>
-            <a:r>
-              <a:rPr lang="de-DE" b="1" err="1"/>
-              <a:t>for</a:t>
-            </a:r>
-            <a:r>
-              <a:rPr lang="de-DE" b="1"/>
-              <a:t> Multiple Sessions</a:t>
-            </a:r>
-            <a:br>
-              <a:rPr lang="de-DE"/>
-            </a:br>
-            <a:r>
-              <a:rPr lang="de-DE"/>
-              <a:t>Die Server-Architektur ermöglicht </a:t>
-            </a:r>
-            <a:r>
-              <a:rPr lang="de-DE" b="1"/>
-              <a:t>gleichzeitige Spiele</a:t>
-            </a:r>
-            <a:r>
-              <a:rPr lang="de-DE"/>
-              <a:t> und eine effiziente Ressourcennutzung, um mehrere Spielsessions parallel zu verwalten.</a:t>
-            </a:r>
-          </a:p>
-          <a:p>
-            <a:r>
-              <a:rPr lang="de-DE"/>
-              <a:t>🔒 </a:t>
-            </a:r>
-            <a:r>
-              <a:rPr lang="de-DE" b="1"/>
-              <a:t>Secure Authentication &amp; </a:t>
-            </a:r>
-            <a:r>
-              <a:rPr lang="de-DE" b="1" err="1"/>
-              <a:t>Encrypted</a:t>
-            </a:r>
-            <a:r>
-              <a:rPr lang="de-DE" b="1"/>
-              <a:t> Communication</a:t>
-            </a:r>
-            <a:br>
-              <a:rPr lang="de-DE"/>
-            </a:br>
-            <a:r>
-              <a:rPr lang="de-DE"/>
-              <a:t>Spielerdaten und Kommunikation sind durch </a:t>
-            </a:r>
-            <a:r>
-              <a:rPr lang="de-DE" b="1"/>
-              <a:t>verschlüsselte Authentifizierung und gesicherte Netzwerkverbindungen</a:t>
-            </a:r>
-            <a:r>
-              <a:rPr lang="de-DE"/>
-              <a:t> geschützt, um Datenschutz und Sicherheit zu gewährleisten.</a:t>
-            </a:r>
-          </a:p>
-          <a:p>
-            <a:r>
-              <a:rPr lang="de-DE"/>
-              <a:t>🎯 </a:t>
-            </a:r>
-            <a:r>
-              <a:rPr lang="de-DE" b="1" err="1"/>
-              <a:t>Accurate</a:t>
-            </a:r>
-            <a:r>
-              <a:rPr lang="de-DE" b="1"/>
-              <a:t> </a:t>
-            </a:r>
-            <a:r>
-              <a:rPr lang="de-DE" b="1" err="1"/>
-              <a:t>Collision</a:t>
-            </a:r>
-            <a:r>
-              <a:rPr lang="de-DE" b="1"/>
-              <a:t> </a:t>
-            </a:r>
-            <a:r>
-              <a:rPr lang="de-DE" b="1" err="1"/>
-              <a:t>Detection</a:t>
-            </a:r>
-            <a:br>
-              <a:rPr lang="de-DE"/>
-            </a:br>
-            <a:r>
-              <a:rPr lang="de-DE"/>
-              <a:t>Eine präzise </a:t>
-            </a:r>
-            <a:r>
-              <a:rPr lang="de-DE" b="1"/>
-              <a:t>Kollisionserkennung</a:t>
-            </a:r>
-            <a:r>
-              <a:rPr lang="de-DE"/>
-              <a:t> sorgt für realistische Interaktionen zwischen Charakteren, Hindernissen und der Umgebung.</a:t>
-            </a:r>
-          </a:p>
-          <a:p>
-            <a:r>
-              <a:rPr lang="de-DE"/>
-              <a:t>🖥 </a:t>
-            </a:r>
-            <a:r>
-              <a:rPr lang="de-DE" b="1" err="1"/>
-              <a:t>Optimized</a:t>
-            </a:r>
-            <a:r>
-              <a:rPr lang="de-DE" b="1"/>
-              <a:t> </a:t>
-            </a:r>
-            <a:r>
-              <a:rPr lang="de-DE" b="1" err="1"/>
-              <a:t>for</a:t>
-            </a:r>
-            <a:r>
-              <a:rPr lang="de-DE" b="1"/>
-              <a:t> Standard Hardware</a:t>
-            </a:r>
-            <a:br>
-              <a:rPr lang="de-DE"/>
-            </a:br>
-            <a:r>
-              <a:rPr lang="de-DE"/>
-              <a:t>Das Spiel ist so konzipiert, dass es auf </a:t>
-            </a:r>
-            <a:r>
-              <a:rPr lang="de-DE" b="1"/>
-              <a:t>gängigen Endgeräten</a:t>
-            </a:r>
-            <a:r>
-              <a:rPr lang="de-DE"/>
-              <a:t> problemlos läuft, ohne spezielle Hardware-Anforderungen.</a:t>
-            </a:r>
-          </a:p>
-          <a:p>
-            <a:r>
-              <a:rPr lang="de-DE"/>
-              <a:t>🌐 </a:t>
-            </a:r>
-            <a:r>
-              <a:rPr lang="de-DE" b="1" err="1"/>
-              <a:t>Stable</a:t>
-            </a:r>
-            <a:r>
-              <a:rPr lang="de-DE" b="1"/>
-              <a:t> Network Connection </a:t>
-            </a:r>
-            <a:r>
-              <a:rPr lang="de-DE" b="1" err="1"/>
-              <a:t>Assumption</a:t>
-            </a:r>
-            <a:br>
-              <a:rPr lang="de-DE"/>
-            </a:br>
-            <a:r>
-              <a:rPr lang="de-DE"/>
-              <a:t>Für eine zuverlässige Performance setzen wir eine </a:t>
-            </a:r>
-            <a:r>
-              <a:rPr lang="de-DE" b="1"/>
-              <a:t>stabile Internetverbindung</a:t>
-            </a:r>
-            <a:r>
-              <a:rPr lang="de-DE"/>
-              <a:t> voraus, insbesondere innerhalb des </a:t>
-            </a:r>
-            <a:r>
-              <a:rPr lang="de-DE" b="1"/>
-              <a:t>universitären Netzwerks</a:t>
-            </a:r>
-            <a:r>
-              <a:rPr lang="de-DE"/>
-              <a:t>.</a:t>
-            </a:r>
-          </a:p>
-          <a:p>
-            <a:r>
-              <a:rPr lang="de-DE"/>
-              <a:t>Diese Anforderungen stellen sicher, dass </a:t>
-            </a:r>
-            <a:r>
-              <a:rPr lang="de-DE" b="1"/>
-              <a:t>Escape Room Game</a:t>
-            </a:r>
-            <a:r>
-              <a:rPr lang="de-DE"/>
-              <a:t> nicht nur technisch funktioniert, sondern auch ein </a:t>
-            </a:r>
-            <a:r>
-              <a:rPr lang="de-DE" b="1"/>
-              <a:t>stabiles, sicheres und zugängliches Spielerlebnis</a:t>
-            </a:r>
-            <a:r>
-              <a:rPr lang="de-DE"/>
-              <a:t> bietet.</a:t>
-            </a:r>
-          </a:p>
-          <a:p>
-            <a:br>
-              <a:rPr lang="de-CH">
-                <a:cs typeface="+mn-lt"/>
-              </a:rPr>
-            </a:br>
-            <a:endParaRPr lang="de-CH"/>
-          </a:p>
-        </p:txBody>
-      </p:sp>
-      <p:sp>
-        <p:nvSpPr>
-          <p:cNvPr id="4" name="Slide Number Placeholder 3">
-            <a:extLst>
-              <a:ext uri="{FF2B5EF4-FFF2-40B4-BE49-F238E27FC236}">
-                <a16:creationId xmlns:a16="http://schemas.microsoft.com/office/drawing/2014/main" id="{9E41B5A9-8FBC-4CFF-E2A2-EBDDDDCDCDD6}"/>
-              </a:ext>
-            </a:extLst>
-          </p:cNvPr>
-          <p:cNvSpPr>
-            <a:spLocks noGrp="1"/>
-          </p:cNvSpPr>
-          <p:nvPr>
-            <p:ph type="sldNum" sz="quarter" idx="5"/>
-          </p:nvPr>
-        </p:nvSpPr>
-        <p:spPr/>
-        <p:txBody>
-          <a:bodyPr/>
-          <a:lstStyle/>
-          <a:p>
-            <a:fld id="{D3601A89-DBFB-4F6A-83EE-ADE86D57FE12}" type="slidenum">
-              <a:rPr lang="de-CH" smtClean="0"/>
-              <a:t>9</a:t>
-            </a:fld>
-            <a:endParaRPr lang="de-CH"/>
-          </a:p>
-        </p:txBody>
-      </p:sp>
-    </p:spTree>
-    <p:extLst>
-      <p:ext uri="{BB962C8B-B14F-4D97-AF65-F5344CB8AC3E}">
-        <p14:creationId xmlns:p14="http://schemas.microsoft.com/office/powerpoint/2010/main" val="3807248152"/>
-      </p:ext>
-    </p:extLst>
-  </p:cSld>
-  <p:clrMapOvr>
-    <a:masterClrMapping/>
-  </p:clrMapOvr>
-</p:notes>
-</file>
-
-<file path=ppt/notesSlides/notesSlide6.xml><?xml version="1.0" encoding="utf-8"?>
+<file path=ppt/notesSlides/notesSlide3.xml><?xml version="1.0" encoding="utf-8"?>
 <p:notes xmlns:a="http://schemas.openxmlformats.org/drawingml/2006/main" xmlns:r="http://schemas.openxmlformats.org/officeDocument/2006/relationships" xmlns:p="http://schemas.openxmlformats.org/presentationml/2006/main">
   <p:cSld>
     <p:spTree>
@@ -1611,7 +891,207 @@
           <a:bodyPr/>
           <a:lstStyle/>
           <a:p>
-            <a:endParaRPr lang="en-GB"/>
+            <a:pPr>
+              <a:lnSpc>
+                <a:spcPct val="107000"/>
+              </a:lnSpc>
+              <a:spcAft>
+                <a:spcPts val="800"/>
+              </a:spcAft>
+            </a:pPr>
+            <a:r>
+              <a:rPr lang="en-US" sz="1800" kern="100" dirty="0">
+                <a:solidFill>
+                  <a:srgbClr val="C00000"/>
+                </a:solidFill>
+                <a:effectLst/>
+                <a:latin typeface="Calibri" panose="020F0502020204030204" pitchFamily="34" charset="0"/>
+                <a:ea typeface="Calibri" panose="020F0502020204030204" pitchFamily="34" charset="0"/>
+                <a:cs typeface="Times New Roman" panose="02020603050405020304" pitchFamily="18" charset="0"/>
+              </a:rPr>
+              <a:t>Do you remember the thrill of playing </a:t>
+            </a:r>
+            <a:r>
+              <a:rPr lang="en-US" sz="1800" b="1" kern="100" dirty="0">
+                <a:solidFill>
+                  <a:srgbClr val="C00000"/>
+                </a:solidFill>
+                <a:effectLst/>
+                <a:latin typeface="Calibri" panose="020F0502020204030204" pitchFamily="34" charset="0"/>
+                <a:ea typeface="Calibri" panose="020F0502020204030204" pitchFamily="34" charset="0"/>
+                <a:cs typeface="Times New Roman" panose="02020603050405020304" pitchFamily="18" charset="0"/>
+              </a:rPr>
+              <a:t>Super Mario</a:t>
+            </a:r>
+            <a:r>
+              <a:rPr lang="en-US" sz="1800" kern="100" dirty="0">
+                <a:solidFill>
+                  <a:srgbClr val="C00000"/>
+                </a:solidFill>
+                <a:effectLst/>
+                <a:latin typeface="Calibri" panose="020F0502020204030204" pitchFamily="34" charset="0"/>
+                <a:ea typeface="Calibri" panose="020F0502020204030204" pitchFamily="34" charset="0"/>
+                <a:cs typeface="Times New Roman" panose="02020603050405020304" pitchFamily="18" charset="0"/>
+              </a:rPr>
+              <a:t> or </a:t>
+            </a:r>
+            <a:r>
+              <a:rPr lang="en-US" sz="1800" b="1" kern="100" dirty="0">
+                <a:solidFill>
+                  <a:srgbClr val="C00000"/>
+                </a:solidFill>
+                <a:effectLst/>
+                <a:latin typeface="Calibri" panose="020F0502020204030204" pitchFamily="34" charset="0"/>
+                <a:ea typeface="Calibri" panose="020F0502020204030204" pitchFamily="34" charset="0"/>
+                <a:cs typeface="Times New Roman" panose="02020603050405020304" pitchFamily="18" charset="0"/>
+              </a:rPr>
+              <a:t>Fireboy and </a:t>
+            </a:r>
+            <a:r>
+              <a:rPr lang="en-US" sz="1800" b="1" kern="100" dirty="0" err="1">
+                <a:solidFill>
+                  <a:srgbClr val="C00000"/>
+                </a:solidFill>
+                <a:effectLst/>
+                <a:latin typeface="Calibri" panose="020F0502020204030204" pitchFamily="34" charset="0"/>
+                <a:ea typeface="Calibri" panose="020F0502020204030204" pitchFamily="34" charset="0"/>
+                <a:cs typeface="Times New Roman" panose="02020603050405020304" pitchFamily="18" charset="0"/>
+              </a:rPr>
+              <a:t>Watergirl</a:t>
+            </a:r>
+            <a:r>
+              <a:rPr lang="en-US" sz="1800" kern="100" dirty="0">
+                <a:solidFill>
+                  <a:srgbClr val="C00000"/>
+                </a:solidFill>
+                <a:effectLst/>
+                <a:latin typeface="Calibri" panose="020F0502020204030204" pitchFamily="34" charset="0"/>
+                <a:ea typeface="Calibri" panose="020F0502020204030204" pitchFamily="34" charset="0"/>
+                <a:cs typeface="Times New Roman" panose="02020603050405020304" pitchFamily="18" charset="0"/>
+              </a:rPr>
+              <a:t>? Spending hours at your parents computer , solving puzzles, overcoming levels, and learning the power of teamwork.</a:t>
+            </a:r>
+            <a:endParaRPr lang="de-CH" sz="1800" kern="100" dirty="0">
+              <a:effectLst/>
+              <a:latin typeface="Calibri" panose="020F0502020204030204" pitchFamily="34" charset="0"/>
+              <a:ea typeface="Calibri" panose="020F0502020204030204" pitchFamily="34" charset="0"/>
+              <a:cs typeface="Times New Roman" panose="02020603050405020304" pitchFamily="18" charset="0"/>
+            </a:endParaRPr>
+          </a:p>
+          <a:p>
+            <a:pPr>
+              <a:lnSpc>
+                <a:spcPct val="107000"/>
+              </a:lnSpc>
+              <a:spcAft>
+                <a:spcPts val="800"/>
+              </a:spcAft>
+            </a:pPr>
+            <a:r>
+              <a:rPr lang="en-US" sz="1800" kern="100" dirty="0">
+                <a:solidFill>
+                  <a:srgbClr val="C00000"/>
+                </a:solidFill>
+                <a:effectLst/>
+                <a:latin typeface="Calibri" panose="020F0502020204030204" pitchFamily="34" charset="0"/>
+                <a:ea typeface="Calibri" panose="020F0502020204030204" pitchFamily="34" charset="0"/>
+                <a:cs typeface="Times New Roman" panose="02020603050405020304" pitchFamily="18" charset="0"/>
+              </a:rPr>
+              <a:t>These games taught us patience, problem-solving, and trust – and that’s exactly what we wanted to bring back. Our new game captures the nostalgia of those classics but with a new twist!</a:t>
+            </a:r>
+            <a:endParaRPr lang="de-CH" sz="1800" kern="100" dirty="0">
+              <a:effectLst/>
+              <a:latin typeface="Calibri" panose="020F0502020204030204" pitchFamily="34" charset="0"/>
+              <a:ea typeface="Calibri" panose="020F0502020204030204" pitchFamily="34" charset="0"/>
+              <a:cs typeface="Times New Roman" panose="02020603050405020304" pitchFamily="18" charset="0"/>
+            </a:endParaRPr>
+          </a:p>
+          <a:p>
+            <a:pPr>
+              <a:lnSpc>
+                <a:spcPct val="107000"/>
+              </a:lnSpc>
+              <a:spcAft>
+                <a:spcPts val="800"/>
+              </a:spcAft>
+            </a:pPr>
+            <a:r>
+              <a:rPr lang="en-US" sz="1800" kern="100" dirty="0">
+                <a:solidFill>
+                  <a:srgbClr val="C00000"/>
+                </a:solidFill>
+                <a:effectLst/>
+                <a:latin typeface="Calibri" panose="020F0502020204030204" pitchFamily="34" charset="0"/>
+                <a:ea typeface="Calibri" panose="020F0502020204030204" pitchFamily="34" charset="0"/>
+                <a:cs typeface="Times New Roman" panose="02020603050405020304" pitchFamily="18" charset="0"/>
+              </a:rPr>
+              <a:t> </a:t>
+            </a:r>
+            <a:endParaRPr lang="de-CH" sz="1800" kern="100" dirty="0">
+              <a:effectLst/>
+              <a:latin typeface="Calibri" panose="020F0502020204030204" pitchFamily="34" charset="0"/>
+              <a:ea typeface="Calibri" panose="020F0502020204030204" pitchFamily="34" charset="0"/>
+              <a:cs typeface="Times New Roman" panose="02020603050405020304" pitchFamily="18" charset="0"/>
+            </a:endParaRPr>
+          </a:p>
+          <a:p>
+            <a:pPr>
+              <a:lnSpc>
+                <a:spcPct val="107000"/>
+              </a:lnSpc>
+              <a:spcAft>
+                <a:spcPts val="800"/>
+              </a:spcAft>
+            </a:pPr>
+            <a:r>
+              <a:rPr lang="en-US" sz="1800" kern="100" dirty="0">
+                <a:solidFill>
+                  <a:srgbClr val="C00000"/>
+                </a:solidFill>
+                <a:effectLst/>
+                <a:latin typeface="Calibri" panose="020F0502020204030204" pitchFamily="34" charset="0"/>
+                <a:ea typeface="Calibri" panose="020F0502020204030204" pitchFamily="34" charset="0"/>
+                <a:cs typeface="Times New Roman" panose="02020603050405020304" pitchFamily="18" charset="0"/>
+              </a:rPr>
+              <a:t>Our Game is a 2D jump and run Puzzle platformer for four players. But here’s the catch – each character is controlled by two players at the same time. A real challenge that can only be mastered through communication and cooperation. </a:t>
+            </a:r>
+            <a:endParaRPr lang="de-CH" sz="1800" kern="100" dirty="0">
+              <a:effectLst/>
+              <a:latin typeface="Calibri" panose="020F0502020204030204" pitchFamily="34" charset="0"/>
+              <a:ea typeface="Calibri" panose="020F0502020204030204" pitchFamily="34" charset="0"/>
+              <a:cs typeface="Times New Roman" panose="02020603050405020304" pitchFamily="18" charset="0"/>
+            </a:endParaRPr>
+          </a:p>
+          <a:p>
+            <a:pPr>
+              <a:lnSpc>
+                <a:spcPct val="107000"/>
+              </a:lnSpc>
+              <a:spcAft>
+                <a:spcPts val="800"/>
+              </a:spcAft>
+            </a:pPr>
+            <a:r>
+              <a:rPr lang="en-US" sz="1800" kern="100" dirty="0">
+                <a:solidFill>
+                  <a:srgbClr val="C00000"/>
+                </a:solidFill>
+                <a:effectLst/>
+                <a:latin typeface="Calibri" panose="020F0502020204030204" pitchFamily="34" charset="0"/>
+                <a:ea typeface="Calibri" panose="020F0502020204030204" pitchFamily="34" charset="0"/>
+                <a:cs typeface="Times New Roman" panose="02020603050405020304" pitchFamily="18" charset="0"/>
+              </a:rPr>
+              <a:t>The goal is to complete the level together – through skillful jumping, puzzle solving and cooperative mechanics. </a:t>
+            </a:r>
+            <a:endParaRPr lang="de-CH" sz="1800" kern="100" dirty="0">
+              <a:effectLst/>
+              <a:latin typeface="Calibri" panose="020F0502020204030204" pitchFamily="34" charset="0"/>
+              <a:ea typeface="Calibri" panose="020F0502020204030204" pitchFamily="34" charset="0"/>
+              <a:cs typeface="Times New Roman" panose="02020603050405020304" pitchFamily="18" charset="0"/>
+            </a:endParaRPr>
+          </a:p>
+          <a:p>
+            <a:endParaRPr lang="de-CH" dirty="0"/>
           </a:p>
         </p:txBody>
       </p:sp>
@@ -1632,7 +1112,7 @@
           <a:p>
             <a:fld id="{D3601A89-DBFB-4F6A-83EE-ADE86D57FE12}" type="slidenum">
               <a:rPr lang="de-CH" smtClean="0"/>
-              <a:t>10</a:t>
+              <a:t>3</a:t>
             </a:fld>
             <a:endParaRPr lang="de-CH"/>
           </a:p>
@@ -1641,7 +1121,7 @@
     </p:spTree>
     <p:extLst>
       <p:ext uri="{BB962C8B-B14F-4D97-AF65-F5344CB8AC3E}">
-        <p14:creationId xmlns:p14="http://schemas.microsoft.com/office/powerpoint/2010/main" val="2866445731"/>
+        <p14:creationId xmlns:p14="http://schemas.microsoft.com/office/powerpoint/2010/main" val="2336080979"/>
       </p:ext>
     </p:extLst>
   </p:cSld>
@@ -1651,7 +1131,7 @@
 </p:notes>
 </file>
 
-<file path=ppt/notesSlides/notesSlide7.xml><?xml version="1.0" encoding="utf-8"?>
+<file path=ppt/notesSlides/notesSlide4.xml><?xml version="1.0" encoding="utf-8"?>
 <p:notes xmlns:a="http://schemas.openxmlformats.org/drawingml/2006/main" xmlns:r="http://schemas.openxmlformats.org/officeDocument/2006/relationships" xmlns:p="http://schemas.openxmlformats.org/presentationml/2006/main">
   <p:cSld>
     <p:spTree>
@@ -1695,7 +1175,171 @@
           <a:bodyPr/>
           <a:lstStyle/>
           <a:p>
-            <a:endParaRPr lang="de-CH"/>
+            <a:pPr>
+              <a:lnSpc>
+                <a:spcPct val="107000"/>
+              </a:lnSpc>
+              <a:spcAft>
+                <a:spcPts val="800"/>
+              </a:spcAft>
+            </a:pPr>
+            <a:r>
+              <a:rPr lang="en-US" sz="1800" kern="100" dirty="0">
+                <a:solidFill>
+                  <a:srgbClr val="C00000"/>
+                </a:solidFill>
+                <a:effectLst/>
+                <a:latin typeface="Calibri" panose="020F0502020204030204" pitchFamily="34" charset="0"/>
+                <a:ea typeface="Calibri" panose="020F0502020204030204" pitchFamily="34" charset="0"/>
+                <a:cs typeface="Times New Roman" panose="02020603050405020304" pitchFamily="18" charset="0"/>
+              </a:rPr>
+              <a:t>Our level design is more than just platforms and obstacles. It’s a challenge that forces teamwork.</a:t>
+            </a:r>
+            <a:endParaRPr lang="de-CH" sz="1800" kern="100" dirty="0">
+              <a:effectLst/>
+              <a:latin typeface="Calibri" panose="020F0502020204030204" pitchFamily="34" charset="0"/>
+              <a:ea typeface="Calibri" panose="020F0502020204030204" pitchFamily="34" charset="0"/>
+              <a:cs typeface="Times New Roman" panose="02020603050405020304" pitchFamily="18" charset="0"/>
+            </a:endParaRPr>
+          </a:p>
+          <a:p>
+            <a:pPr>
+              <a:lnSpc>
+                <a:spcPct val="107000"/>
+              </a:lnSpc>
+              <a:spcAft>
+                <a:spcPts val="800"/>
+              </a:spcAft>
+            </a:pPr>
+            <a:r>
+              <a:rPr lang="en-US" sz="1800" kern="100" dirty="0">
+                <a:solidFill>
+                  <a:srgbClr val="C00000"/>
+                </a:solidFill>
+                <a:effectLst/>
+                <a:latin typeface="Calibri" panose="020F0502020204030204" pitchFamily="34" charset="0"/>
+                <a:ea typeface="Calibri" panose="020F0502020204030204" pitchFamily="34" charset="0"/>
+                <a:cs typeface="Times New Roman" panose="02020603050405020304" pitchFamily="18" charset="0"/>
+              </a:rPr>
+              <a:t>There are Moving and standing platforms, which require perfect synchronization. With </a:t>
+            </a:r>
+            <a:endParaRPr lang="de-CH" sz="1800" kern="100" dirty="0">
+              <a:effectLst/>
+              <a:latin typeface="Calibri" panose="020F0502020204030204" pitchFamily="34" charset="0"/>
+              <a:ea typeface="Calibri" panose="020F0502020204030204" pitchFamily="34" charset="0"/>
+              <a:cs typeface="Times New Roman" panose="02020603050405020304" pitchFamily="18" charset="0"/>
+            </a:endParaRPr>
+          </a:p>
+          <a:p>
+            <a:pPr>
+              <a:lnSpc>
+                <a:spcPct val="107000"/>
+              </a:lnSpc>
+              <a:spcAft>
+                <a:spcPts val="800"/>
+              </a:spcAft>
+            </a:pPr>
+            <a:r>
+              <a:rPr lang="en-US" sz="1800" b="1" kern="100" dirty="0">
+                <a:solidFill>
+                  <a:srgbClr val="C00000"/>
+                </a:solidFill>
+                <a:effectLst/>
+                <a:latin typeface="Calibri" panose="020F0502020204030204" pitchFamily="34" charset="0"/>
+                <a:ea typeface="Calibri" panose="020F0502020204030204" pitchFamily="34" charset="0"/>
+                <a:cs typeface="Times New Roman" panose="02020603050405020304" pitchFamily="18" charset="0"/>
+              </a:rPr>
+              <a:t>Interactive Camera Control</a:t>
+            </a:r>
+            <a:r>
+              <a:rPr lang="en-US" sz="1800" kern="100" dirty="0">
+                <a:solidFill>
+                  <a:srgbClr val="C00000"/>
+                </a:solidFill>
+                <a:effectLst/>
+                <a:latin typeface="Calibri" panose="020F0502020204030204" pitchFamily="34" charset="0"/>
+                <a:ea typeface="Calibri" panose="020F0502020204030204" pitchFamily="34" charset="0"/>
+                <a:cs typeface="Times New Roman" panose="02020603050405020304" pitchFamily="18" charset="0"/>
+              </a:rPr>
+              <a:t>: so that the perspective dynamically shifts to highlight challenges.  and </a:t>
+            </a:r>
+            <a:endParaRPr lang="de-CH" sz="1800" kern="100" dirty="0">
+              <a:effectLst/>
+              <a:latin typeface="Calibri" panose="020F0502020204030204" pitchFamily="34" charset="0"/>
+              <a:ea typeface="Calibri" panose="020F0502020204030204" pitchFamily="34" charset="0"/>
+              <a:cs typeface="Times New Roman" panose="02020603050405020304" pitchFamily="18" charset="0"/>
+            </a:endParaRPr>
+          </a:p>
+          <a:p>
+            <a:pPr>
+              <a:lnSpc>
+                <a:spcPct val="107000"/>
+              </a:lnSpc>
+              <a:spcAft>
+                <a:spcPts val="800"/>
+              </a:spcAft>
+            </a:pPr>
+            <a:r>
+              <a:rPr lang="en-US" sz="1800" b="1" kern="100" dirty="0">
+                <a:solidFill>
+                  <a:srgbClr val="C00000"/>
+                </a:solidFill>
+                <a:effectLst/>
+                <a:latin typeface="Calibri" panose="020F0502020204030204" pitchFamily="34" charset="0"/>
+                <a:ea typeface="Calibri" panose="020F0502020204030204" pitchFamily="34" charset="0"/>
+                <a:cs typeface="Times New Roman" panose="02020603050405020304" pitchFamily="18" charset="0"/>
+              </a:rPr>
+              <a:t>Items</a:t>
+            </a:r>
+            <a:r>
+              <a:rPr lang="en-US" sz="1800" kern="100" dirty="0">
+                <a:solidFill>
+                  <a:srgbClr val="C00000"/>
+                </a:solidFill>
+                <a:effectLst/>
+                <a:latin typeface="Calibri" panose="020F0502020204030204" pitchFamily="34" charset="0"/>
+                <a:ea typeface="Calibri" panose="020F0502020204030204" pitchFamily="34" charset="0"/>
+                <a:cs typeface="Times New Roman" panose="02020603050405020304" pitchFamily="18" charset="0"/>
+              </a:rPr>
+              <a:t>: like A flashlight, a rope, boxes—simple objects that become powerful tools in the right hands.</a:t>
+            </a:r>
+            <a:endParaRPr lang="de-CH" sz="1800" kern="100" dirty="0">
+              <a:effectLst/>
+              <a:latin typeface="Calibri" panose="020F0502020204030204" pitchFamily="34" charset="0"/>
+              <a:ea typeface="Calibri" panose="020F0502020204030204" pitchFamily="34" charset="0"/>
+              <a:cs typeface="Times New Roman" panose="02020603050405020304" pitchFamily="18" charset="0"/>
+            </a:endParaRPr>
+          </a:p>
+          <a:p>
+            <a:pPr>
+              <a:lnSpc>
+                <a:spcPct val="107000"/>
+              </a:lnSpc>
+              <a:spcAft>
+                <a:spcPts val="800"/>
+              </a:spcAft>
+            </a:pPr>
+            <a:r>
+              <a:rPr lang="en-US" sz="1800" kern="100" dirty="0">
+                <a:solidFill>
+                  <a:srgbClr val="C00000"/>
+                </a:solidFill>
+                <a:effectLst/>
+                <a:latin typeface="Calibri" panose="020F0502020204030204" pitchFamily="34" charset="0"/>
+                <a:ea typeface="Calibri" panose="020F0502020204030204" pitchFamily="34" charset="0"/>
+                <a:cs typeface="Times New Roman" panose="02020603050405020304" pitchFamily="18" charset="0"/>
+              </a:rPr>
+              <a:t>Each section of the game is designed so that players can only progress by combining their skills and truly acting as a team</a:t>
+            </a:r>
+            <a:endParaRPr lang="de-CH" sz="1800" kern="100" dirty="0">
+              <a:effectLst/>
+              <a:latin typeface="Calibri" panose="020F0502020204030204" pitchFamily="34" charset="0"/>
+              <a:ea typeface="Calibri" panose="020F0502020204030204" pitchFamily="34" charset="0"/>
+              <a:cs typeface="Times New Roman" panose="02020603050405020304" pitchFamily="18" charset="0"/>
+            </a:endParaRPr>
+          </a:p>
+          <a:p>
+            <a:endParaRPr lang="de-CH" dirty="0"/>
           </a:p>
         </p:txBody>
       </p:sp>
@@ -1716,7 +1360,7 @@
           <a:p>
             <a:fld id="{D3601A89-DBFB-4F6A-83EE-ADE86D57FE12}" type="slidenum">
               <a:rPr lang="de-CH" smtClean="0"/>
-              <a:t>12</a:t>
+              <a:t>4</a:t>
             </a:fld>
             <a:endParaRPr lang="de-CH"/>
           </a:p>
@@ -1725,7 +1369,649 @@
     </p:spTree>
     <p:extLst>
       <p:ext uri="{BB962C8B-B14F-4D97-AF65-F5344CB8AC3E}">
-        <p14:creationId xmlns:p14="http://schemas.microsoft.com/office/powerpoint/2010/main" val="2302575546"/>
+        <p14:creationId xmlns:p14="http://schemas.microsoft.com/office/powerpoint/2010/main" val="3480773554"/>
+      </p:ext>
+    </p:extLst>
+  </p:cSld>
+  <p:clrMapOvr>
+    <a:masterClrMapping/>
+  </p:clrMapOvr>
+</p:notes>
+</file>
+
+<file path=ppt/notesSlides/notesSlide5.xml><?xml version="1.0" encoding="utf-8"?>
+<p:notes xmlns:a="http://schemas.openxmlformats.org/drawingml/2006/main" xmlns:r="http://schemas.openxmlformats.org/officeDocument/2006/relationships" xmlns:p="http://schemas.openxmlformats.org/presentationml/2006/main">
+  <p:cSld>
+    <p:spTree>
+      <p:nvGrpSpPr>
+        <p:cNvPr id="1" name=""/>
+        <p:cNvGrpSpPr/>
+        <p:nvPr/>
+      </p:nvGrpSpPr>
+      <p:grpSpPr>
+        <a:xfrm>
+          <a:off x="0" y="0"/>
+          <a:ext cx="0" cy="0"/>
+          <a:chOff x="0" y="0"/>
+          <a:chExt cx="0" cy="0"/>
+        </a:xfrm>
+      </p:grpSpPr>
+      <p:sp>
+        <p:nvSpPr>
+          <p:cNvPr id="2" name="Folienbildplatzhalter 1"/>
+          <p:cNvSpPr>
+            <a:spLocks noGrp="1" noRot="1" noChangeAspect="1"/>
+          </p:cNvSpPr>
+          <p:nvPr>
+            <p:ph type="sldImg"/>
+          </p:nvPr>
+        </p:nvSpPr>
+        <p:spPr/>
+      </p:sp>
+      <p:sp>
+        <p:nvSpPr>
+          <p:cNvPr id="3" name="Notizenplatzhalter 2"/>
+          <p:cNvSpPr>
+            <a:spLocks noGrp="1"/>
+          </p:cNvSpPr>
+          <p:nvPr>
+            <p:ph type="body" idx="1"/>
+          </p:nvPr>
+        </p:nvSpPr>
+        <p:spPr/>
+        <p:txBody>
+          <a:bodyPr/>
+          <a:lstStyle/>
+          <a:p>
+            <a:pPr marL="0" marR="0" lvl="0" indent="0" algn="l" defTabSz="914400" rtl="0" eaLnBrk="1" fontAlgn="auto" latinLnBrk="0" hangingPunct="1">
+              <a:lnSpc>
+                <a:spcPct val="100000"/>
+              </a:lnSpc>
+              <a:spcBef>
+                <a:spcPts val="0"/>
+              </a:spcBef>
+              <a:spcAft>
+                <a:spcPts val="0"/>
+              </a:spcAft>
+              <a:buClrTx/>
+              <a:buSzTx/>
+              <a:buFontTx/>
+              <a:buNone/>
+              <a:tabLst/>
+              <a:defRPr/>
+            </a:pPr>
+            <a:r>
+              <a:rPr lang="en-US" sz="1800" kern="100" dirty="0">
+                <a:solidFill>
+                  <a:srgbClr val="C00000"/>
+                </a:solidFill>
+                <a:effectLst/>
+                <a:latin typeface="Calibri" panose="020F0502020204030204" pitchFamily="34" charset="0"/>
+                <a:ea typeface="Calibri" panose="020F0502020204030204" pitchFamily="34" charset="0"/>
+                <a:cs typeface="Times New Roman" panose="02020603050405020304" pitchFamily="18" charset="0"/>
+              </a:rPr>
+              <a:t>One player controls movement and throwing, while the other controls jumping and grabbing. It sounds simple, right? But the moment you start playing, you realize just how much coordination, communication, and trust it requires.</a:t>
+            </a:r>
+            <a:endParaRPr lang="de-CH" sz="1800" kern="100" dirty="0">
+              <a:effectLst/>
+              <a:latin typeface="Calibri" panose="020F0502020204030204" pitchFamily="34" charset="0"/>
+              <a:ea typeface="Calibri" panose="020F0502020204030204" pitchFamily="34" charset="0"/>
+              <a:cs typeface="Times New Roman" panose="02020603050405020304" pitchFamily="18" charset="0"/>
+            </a:endParaRPr>
+          </a:p>
+          <a:p>
+            <a:endParaRPr lang="de-CH" dirty="0"/>
+          </a:p>
+        </p:txBody>
+      </p:sp>
+      <p:sp>
+        <p:nvSpPr>
+          <p:cNvPr id="4" name="Foliennummernplatzhalter 3"/>
+          <p:cNvSpPr>
+            <a:spLocks noGrp="1"/>
+          </p:cNvSpPr>
+          <p:nvPr>
+            <p:ph type="sldNum" sz="quarter" idx="5"/>
+          </p:nvPr>
+        </p:nvSpPr>
+        <p:spPr/>
+        <p:txBody>
+          <a:bodyPr/>
+          <a:lstStyle/>
+          <a:p>
+            <a:fld id="{D3601A89-DBFB-4F6A-83EE-ADE86D57FE12}" type="slidenum">
+              <a:rPr lang="de-CH" smtClean="0"/>
+              <a:t>5</a:t>
+            </a:fld>
+            <a:endParaRPr lang="de-CH"/>
+          </a:p>
+        </p:txBody>
+      </p:sp>
+    </p:spTree>
+    <p:extLst>
+      <p:ext uri="{BB962C8B-B14F-4D97-AF65-F5344CB8AC3E}">
+        <p14:creationId xmlns:p14="http://schemas.microsoft.com/office/powerpoint/2010/main" val="3534385056"/>
+      </p:ext>
+    </p:extLst>
+  </p:cSld>
+  <p:clrMapOvr>
+    <a:masterClrMapping/>
+  </p:clrMapOvr>
+</p:notes>
+</file>
+
+<file path=ppt/notesSlides/notesSlide6.xml><?xml version="1.0" encoding="utf-8"?>
+<p:notes xmlns:a="http://schemas.openxmlformats.org/drawingml/2006/main" xmlns:r="http://schemas.openxmlformats.org/officeDocument/2006/relationships" xmlns:p="http://schemas.openxmlformats.org/presentationml/2006/main">
+  <p:cSld>
+    <p:spTree>
+      <p:nvGrpSpPr>
+        <p:cNvPr id="1" name="">
+          <a:extLst>
+            <a:ext uri="{FF2B5EF4-FFF2-40B4-BE49-F238E27FC236}">
+              <a16:creationId xmlns:a16="http://schemas.microsoft.com/office/drawing/2014/main" id="{FC5B8DB9-DE93-68F6-3022-E1D325037EDA}"/>
+            </a:ext>
+          </a:extLst>
+        </p:cNvPr>
+        <p:cNvGrpSpPr/>
+        <p:nvPr/>
+      </p:nvGrpSpPr>
+      <p:grpSpPr>
+        <a:xfrm>
+          <a:off x="0" y="0"/>
+          <a:ext cx="0" cy="0"/>
+          <a:chOff x="0" y="0"/>
+          <a:chExt cx="0" cy="0"/>
+        </a:xfrm>
+      </p:grpSpPr>
+      <p:sp>
+        <p:nvSpPr>
+          <p:cNvPr id="2" name="Slide Image Placeholder 1">
+            <a:extLst>
+              <a:ext uri="{FF2B5EF4-FFF2-40B4-BE49-F238E27FC236}">
+                <a16:creationId xmlns:a16="http://schemas.microsoft.com/office/drawing/2014/main" id="{F5C7C335-4851-9917-2CFB-016414BF5C4D}"/>
+              </a:ext>
+            </a:extLst>
+          </p:cNvPr>
+          <p:cNvSpPr>
+            <a:spLocks noGrp="1" noRot="1" noChangeAspect="1"/>
+          </p:cNvSpPr>
+          <p:nvPr>
+            <p:ph type="sldImg"/>
+          </p:nvPr>
+        </p:nvSpPr>
+        <p:spPr/>
+      </p:sp>
+      <p:sp>
+        <p:nvSpPr>
+          <p:cNvPr id="3" name="Notes Placeholder 2">
+            <a:extLst>
+              <a:ext uri="{FF2B5EF4-FFF2-40B4-BE49-F238E27FC236}">
+                <a16:creationId xmlns:a16="http://schemas.microsoft.com/office/drawing/2014/main" id="{87934621-4A75-451E-10F6-098C20415BBF}"/>
+              </a:ext>
+            </a:extLst>
+          </p:cNvPr>
+          <p:cNvSpPr>
+            <a:spLocks noGrp="1"/>
+          </p:cNvSpPr>
+          <p:nvPr>
+            <p:ph type="body" idx="1"/>
+          </p:nvPr>
+        </p:nvSpPr>
+        <p:spPr/>
+        <p:txBody>
+          <a:bodyPr/>
+          <a:lstStyle/>
+          <a:p>
+            <a:r>
+              <a:rPr lang="en-US"/>
+              <a:t>Our game is built using </a:t>
+            </a:r>
+            <a:r>
+              <a:rPr lang="en-US" b="1"/>
+              <a:t>Java 21</a:t>
+            </a:r>
+            <a:r>
+              <a:rPr lang="en-US"/>
+              <a:t> and relies on a </a:t>
+            </a:r>
+            <a:r>
+              <a:rPr lang="en-US" b="1"/>
+              <a:t>text-based network protocol</a:t>
+            </a:r>
+            <a:r>
+              <a:rPr lang="en-US"/>
+              <a:t> for efficient communication. It is optimized for </a:t>
+            </a:r>
+            <a:r>
+              <a:rPr lang="en-US" b="1"/>
+              <a:t>standard hardware</a:t>
+            </a:r>
+            <a:r>
+              <a:rPr lang="en-US"/>
+              <a:t> and runs within a </a:t>
+            </a:r>
+            <a:r>
+              <a:rPr lang="en-US" b="1"/>
+              <a:t>university-controlled network</a:t>
+            </a:r>
+            <a:r>
+              <a:rPr lang="en-US"/>
+              <a:t>. Security is a top priority, with </a:t>
+            </a:r>
+            <a:r>
+              <a:rPr lang="en-US" b="1"/>
+              <a:t>encrypted authentication and communication</a:t>
+            </a:r>
+            <a:r>
+              <a:rPr lang="en-US"/>
+              <a:t> ensuring a safe multiplayer experience.</a:t>
+            </a:r>
+            <a:br>
+              <a:rPr lang="en-US"/>
+            </a:br>
+            <a:br>
+              <a:rPr lang="en-US"/>
+            </a:br>
+            <a:br>
+              <a:rPr lang="de-CH">
+                <a:cs typeface="+mn-lt"/>
+              </a:rPr>
+            </a:br>
+            <a:endParaRPr lang="de-CH"/>
+          </a:p>
+        </p:txBody>
+      </p:sp>
+      <p:sp>
+        <p:nvSpPr>
+          <p:cNvPr id="4" name="Slide Number Placeholder 3">
+            <a:extLst>
+              <a:ext uri="{FF2B5EF4-FFF2-40B4-BE49-F238E27FC236}">
+                <a16:creationId xmlns:a16="http://schemas.microsoft.com/office/drawing/2014/main" id="{B2ED74A9-2556-BF13-8B2B-483B00DB2AFB}"/>
+              </a:ext>
+            </a:extLst>
+          </p:cNvPr>
+          <p:cNvSpPr>
+            <a:spLocks noGrp="1"/>
+          </p:cNvSpPr>
+          <p:nvPr>
+            <p:ph type="sldNum" sz="quarter" idx="5"/>
+          </p:nvPr>
+        </p:nvSpPr>
+        <p:spPr/>
+        <p:txBody>
+          <a:bodyPr/>
+          <a:lstStyle/>
+          <a:p>
+            <a:fld id="{D3601A89-DBFB-4F6A-83EE-ADE86D57FE12}" type="slidenum">
+              <a:rPr lang="de-CH" smtClean="0"/>
+              <a:t>7</a:t>
+            </a:fld>
+            <a:endParaRPr lang="de-CH"/>
+          </a:p>
+        </p:txBody>
+      </p:sp>
+    </p:spTree>
+    <p:extLst>
+      <p:ext uri="{BB962C8B-B14F-4D97-AF65-F5344CB8AC3E}">
+        <p14:creationId xmlns:p14="http://schemas.microsoft.com/office/powerpoint/2010/main" val="606904964"/>
+      </p:ext>
+    </p:extLst>
+  </p:cSld>
+  <p:clrMapOvr>
+    <a:masterClrMapping/>
+  </p:clrMapOvr>
+</p:notes>
+</file>
+
+<file path=ppt/notesSlides/notesSlide7.xml><?xml version="1.0" encoding="utf-8"?>
+<p:notes xmlns:a="http://schemas.openxmlformats.org/drawingml/2006/main" xmlns:r="http://schemas.openxmlformats.org/officeDocument/2006/relationships" xmlns:p="http://schemas.openxmlformats.org/presentationml/2006/main">
+  <p:cSld>
+    <p:spTree>
+      <p:nvGrpSpPr>
+        <p:cNvPr id="1" name="">
+          <a:extLst>
+            <a:ext uri="{FF2B5EF4-FFF2-40B4-BE49-F238E27FC236}">
+              <a16:creationId xmlns:a16="http://schemas.microsoft.com/office/drawing/2014/main" id="{7F81AE97-965F-67BB-B262-2E5EACCA2E60}"/>
+            </a:ext>
+          </a:extLst>
+        </p:cNvPr>
+        <p:cNvGrpSpPr/>
+        <p:nvPr/>
+      </p:nvGrpSpPr>
+      <p:grpSpPr>
+        <a:xfrm>
+          <a:off x="0" y="0"/>
+          <a:ext cx="0" cy="0"/>
+          <a:chOff x="0" y="0"/>
+          <a:chExt cx="0" cy="0"/>
+        </a:xfrm>
+      </p:grpSpPr>
+      <p:sp>
+        <p:nvSpPr>
+          <p:cNvPr id="2" name="Slide Image Placeholder 1">
+            <a:extLst>
+              <a:ext uri="{FF2B5EF4-FFF2-40B4-BE49-F238E27FC236}">
+                <a16:creationId xmlns:a16="http://schemas.microsoft.com/office/drawing/2014/main" id="{F280889D-0C95-9586-8386-F81A89FA7245}"/>
+              </a:ext>
+            </a:extLst>
+          </p:cNvPr>
+          <p:cNvSpPr>
+            <a:spLocks noGrp="1" noRot="1" noChangeAspect="1"/>
+          </p:cNvSpPr>
+          <p:nvPr>
+            <p:ph type="sldImg"/>
+          </p:nvPr>
+        </p:nvSpPr>
+        <p:spPr/>
+      </p:sp>
+      <p:sp>
+        <p:nvSpPr>
+          <p:cNvPr id="3" name="Notes Placeholder 2">
+            <a:extLst>
+              <a:ext uri="{FF2B5EF4-FFF2-40B4-BE49-F238E27FC236}">
+                <a16:creationId xmlns:a16="http://schemas.microsoft.com/office/drawing/2014/main" id="{9A17D9B8-C6A4-40AE-2AE4-9EFAA34EDCF6}"/>
+              </a:ext>
+            </a:extLst>
+          </p:cNvPr>
+          <p:cNvSpPr>
+            <a:spLocks noGrp="1"/>
+          </p:cNvSpPr>
+          <p:nvPr>
+            <p:ph type="body" idx="1"/>
+          </p:nvPr>
+        </p:nvSpPr>
+        <p:spPr/>
+        <p:txBody>
+          <a:bodyPr/>
+          <a:lstStyle/>
+          <a:p>
+            <a:r>
+              <a:rPr lang="en-US"/>
+              <a:t>To ensure a seamless and immersive gaming experience, our system is built on the following core functionalities:</a:t>
+            </a:r>
+          </a:p>
+          <a:p>
+            <a:r>
+              <a:rPr lang="en-US"/>
+              <a:t>🎯 </a:t>
+            </a:r>
+            <a:r>
+              <a:rPr lang="en-US" b="1"/>
+              <a:t>Robust Client-Server Architecture</a:t>
+            </a:r>
+            <a:r>
+              <a:rPr lang="en-US"/>
+              <a:t> </a:t>
+            </a:r>
+            <a:r>
+              <a:rPr lang="en-US" i="1"/>
+              <a:t>(F10)</a:t>
+            </a:r>
+            <a:br>
+              <a:rPr lang="en-US"/>
+            </a:br>
+            <a:r>
+              <a:rPr lang="en-US"/>
+              <a:t>A custom-built </a:t>
+            </a:r>
+            <a:r>
+              <a:rPr lang="en-US" b="1"/>
+              <a:t>client-server connection</a:t>
+            </a:r>
+            <a:r>
+              <a:rPr lang="en-US"/>
+              <a:t> with an optimized </a:t>
+            </a:r>
+            <a:r>
+              <a:rPr lang="en-US" b="1"/>
+              <a:t>text-based protocol</a:t>
+            </a:r>
+            <a:r>
+              <a:rPr lang="en-US"/>
+              <a:t> ensures efficient communication and real-time responsiveness.</a:t>
+            </a:r>
+          </a:p>
+          <a:p>
+            <a:r>
+              <a:rPr lang="en-US"/>
+              <a:t>🔑 </a:t>
+            </a:r>
+            <a:r>
+              <a:rPr lang="en-US" b="1"/>
+              <a:t>User Authentication &amp; Lobby System</a:t>
+            </a:r>
+            <a:r>
+              <a:rPr lang="en-US"/>
+              <a:t> </a:t>
+            </a:r>
+            <a:r>
+              <a:rPr lang="en-US" i="1"/>
+              <a:t>(F11)</a:t>
+            </a:r>
+            <a:br>
+              <a:rPr lang="en-US"/>
+            </a:br>
+            <a:r>
+              <a:rPr lang="en-US"/>
+              <a:t>Players can securely log in and join </a:t>
+            </a:r>
+            <a:r>
+              <a:rPr lang="en-US" b="1"/>
+              <a:t>game lobbies</a:t>
+            </a:r>
+            <a:r>
+              <a:rPr lang="en-US"/>
+              <a:t>, allowing smooth matchmaking and session management.</a:t>
+            </a:r>
+          </a:p>
+          <a:p>
+            <a:r>
+              <a:rPr lang="en-US"/>
+              <a:t>⚡ </a:t>
+            </a:r>
+            <a:r>
+              <a:rPr lang="en-US" b="1"/>
+              <a:t>Real-Time Gameplay Synchronization</a:t>
+            </a:r>
+            <a:r>
+              <a:rPr lang="en-US"/>
+              <a:t> </a:t>
+            </a:r>
+            <a:r>
+              <a:rPr lang="en-US" i="1"/>
+              <a:t>(F20)</a:t>
+            </a:r>
+            <a:br>
+              <a:rPr lang="en-US"/>
+            </a:br>
+            <a:r>
+              <a:rPr lang="en-US"/>
+              <a:t>Every action is transmitted with minimal latency, ensuring a fluid and responsive </a:t>
+            </a:r>
+            <a:r>
+              <a:rPr lang="en-US" b="1"/>
+              <a:t>multiplayer experience</a:t>
+            </a:r>
+            <a:r>
+              <a:rPr lang="en-US"/>
+              <a:t>.</a:t>
+            </a:r>
+          </a:p>
+          <a:p>
+            <a:r>
+              <a:rPr lang="en-US"/>
+              <a:t>🎮 </a:t>
+            </a:r>
+            <a:r>
+              <a:rPr lang="en-US" b="1"/>
+              <a:t>Role-Specific Actions for Escapers</a:t>
+            </a:r>
+            <a:r>
+              <a:rPr lang="en-US"/>
+              <a:t> </a:t>
+            </a:r>
+            <a:r>
+              <a:rPr lang="en-US" i="1"/>
+              <a:t>(F21)</a:t>
+            </a:r>
+            <a:br>
+              <a:rPr lang="en-US"/>
+            </a:br>
+            <a:r>
+              <a:rPr lang="en-US"/>
+              <a:t>Each player controlling the </a:t>
+            </a:r>
+            <a:r>
+              <a:rPr lang="en-US" b="1"/>
+              <a:t>Escaper</a:t>
+            </a:r>
+            <a:r>
+              <a:rPr lang="en-US"/>
+              <a:t> has a unique role—requiring precise coordination to navigate the game successfully.</a:t>
+            </a:r>
+          </a:p>
+          <a:p>
+            <a:r>
+              <a:rPr lang="en-US"/>
+              <a:t>📷 </a:t>
+            </a:r>
+            <a:r>
+              <a:rPr lang="en-US" b="1"/>
+              <a:t>Dynamic Camera System</a:t>
+            </a:r>
+            <a:r>
+              <a:rPr lang="en-US"/>
+              <a:t> </a:t>
+            </a:r>
+            <a:r>
+              <a:rPr lang="en-US" i="1"/>
+              <a:t>(F22)</a:t>
+            </a:r>
+            <a:br>
+              <a:rPr lang="en-US"/>
+            </a:br>
+            <a:r>
+              <a:rPr lang="en-US"/>
+              <a:t>A smart, </a:t>
+            </a:r>
+            <a:r>
+              <a:rPr lang="en-US" b="1"/>
+              <a:t>adaptive camera system</a:t>
+            </a:r>
+            <a:r>
+              <a:rPr lang="en-US"/>
+              <a:t> keeps the action in focus, enhancing the player experience by ensuring visibility of critical gameplay elements.</a:t>
+            </a:r>
+          </a:p>
+          <a:p>
+            <a:r>
+              <a:rPr lang="en-US"/>
+              <a:t>🏆 </a:t>
+            </a:r>
+            <a:r>
+              <a:rPr lang="en-US" b="1"/>
+              <a:t>Game State Management</a:t>
+            </a:r>
+            <a:r>
+              <a:rPr lang="en-US"/>
+              <a:t> </a:t>
+            </a:r>
+            <a:r>
+              <a:rPr lang="en-US" i="1"/>
+              <a:t>(F30)</a:t>
+            </a:r>
+            <a:br>
+              <a:rPr lang="en-US"/>
+            </a:br>
+            <a:r>
+              <a:rPr lang="en-US"/>
+              <a:t>Real-time handling of </a:t>
+            </a:r>
+            <a:r>
+              <a:rPr lang="en-US" b="1"/>
+              <a:t>collisions, win/loss conditions, and state persistence</a:t>
+            </a:r>
+            <a:r>
+              <a:rPr lang="en-US"/>
+              <a:t> ensures fair and accurate game mechanics.</a:t>
+            </a:r>
+          </a:p>
+          <a:p>
+            <a:r>
+              <a:rPr lang="en-US"/>
+              <a:t>💬 </a:t>
+            </a:r>
+            <a:r>
+              <a:rPr lang="en-US" b="1"/>
+              <a:t>In-Game &amp; Lobby Chat Support</a:t>
+            </a:r>
+            <a:r>
+              <a:rPr lang="en-US"/>
+              <a:t> </a:t>
+            </a:r>
+            <a:r>
+              <a:rPr lang="en-US" i="1"/>
+              <a:t>(F40)</a:t>
+            </a:r>
+            <a:br>
+              <a:rPr lang="en-US"/>
+            </a:br>
+            <a:r>
+              <a:rPr lang="en-US"/>
+              <a:t>A built-in </a:t>
+            </a:r>
+            <a:r>
+              <a:rPr lang="en-US" b="1"/>
+              <a:t>communication system</a:t>
+            </a:r>
+            <a:r>
+              <a:rPr lang="en-US"/>
+              <a:t> allows players to strategize before and during the game, fostering teamwork and interaction.</a:t>
+            </a:r>
+          </a:p>
+          <a:p>
+            <a:br>
+              <a:rPr lang="de-CH">
+                <a:cs typeface="+mn-lt"/>
+              </a:rPr>
+            </a:br>
+            <a:endParaRPr lang="de-CH"/>
+          </a:p>
+        </p:txBody>
+      </p:sp>
+      <p:sp>
+        <p:nvSpPr>
+          <p:cNvPr id="4" name="Slide Number Placeholder 3">
+            <a:extLst>
+              <a:ext uri="{FF2B5EF4-FFF2-40B4-BE49-F238E27FC236}">
+                <a16:creationId xmlns:a16="http://schemas.microsoft.com/office/drawing/2014/main" id="{50E0A62D-B38E-744B-8827-AE824D67EEA3}"/>
+              </a:ext>
+            </a:extLst>
+          </p:cNvPr>
+          <p:cNvSpPr>
+            <a:spLocks noGrp="1"/>
+          </p:cNvSpPr>
+          <p:nvPr>
+            <p:ph type="sldNum" sz="quarter" idx="5"/>
+          </p:nvPr>
+        </p:nvSpPr>
+        <p:spPr/>
+        <p:txBody>
+          <a:bodyPr/>
+          <a:lstStyle/>
+          <a:p>
+            <a:fld id="{D3601A89-DBFB-4F6A-83EE-ADE86D57FE12}" type="slidenum">
+              <a:rPr lang="de-CH" smtClean="0"/>
+              <a:t>8</a:t>
+            </a:fld>
+            <a:endParaRPr lang="de-CH"/>
+          </a:p>
+        </p:txBody>
+      </p:sp>
+    </p:spTree>
+    <p:extLst>
+      <p:ext uri="{BB962C8B-B14F-4D97-AF65-F5344CB8AC3E}">
+        <p14:creationId xmlns:p14="http://schemas.microsoft.com/office/powerpoint/2010/main" val="3349573953"/>
       </p:ext>
     </p:extLst>
   </p:cSld>
@@ -1736,6 +2022,373 @@
 </file>
 
 <file path=ppt/notesSlides/notesSlide8.xml><?xml version="1.0" encoding="utf-8"?>
+<p:notes xmlns:a="http://schemas.openxmlformats.org/drawingml/2006/main" xmlns:r="http://schemas.openxmlformats.org/officeDocument/2006/relationships" xmlns:p="http://schemas.openxmlformats.org/presentationml/2006/main">
+  <p:cSld>
+    <p:spTree>
+      <p:nvGrpSpPr>
+        <p:cNvPr id="1" name="">
+          <a:extLst>
+            <a:ext uri="{FF2B5EF4-FFF2-40B4-BE49-F238E27FC236}">
+              <a16:creationId xmlns:a16="http://schemas.microsoft.com/office/drawing/2014/main" id="{3CC54AAC-948B-C7A8-EBC9-01610305BB2A}"/>
+            </a:ext>
+          </a:extLst>
+        </p:cNvPr>
+        <p:cNvGrpSpPr/>
+        <p:nvPr/>
+      </p:nvGrpSpPr>
+      <p:grpSpPr>
+        <a:xfrm>
+          <a:off x="0" y="0"/>
+          <a:ext cx="0" cy="0"/>
+          <a:chOff x="0" y="0"/>
+          <a:chExt cx="0" cy="0"/>
+        </a:xfrm>
+      </p:grpSpPr>
+      <p:sp>
+        <p:nvSpPr>
+          <p:cNvPr id="2" name="Slide Image Placeholder 1">
+            <a:extLst>
+              <a:ext uri="{FF2B5EF4-FFF2-40B4-BE49-F238E27FC236}">
+                <a16:creationId xmlns:a16="http://schemas.microsoft.com/office/drawing/2014/main" id="{F9B37990-017B-A261-9BCA-36EBC0033F46}"/>
+              </a:ext>
+            </a:extLst>
+          </p:cNvPr>
+          <p:cNvSpPr>
+            <a:spLocks noGrp="1" noRot="1" noChangeAspect="1"/>
+          </p:cNvSpPr>
+          <p:nvPr>
+            <p:ph type="sldImg"/>
+          </p:nvPr>
+        </p:nvSpPr>
+        <p:spPr/>
+      </p:sp>
+      <p:sp>
+        <p:nvSpPr>
+          <p:cNvPr id="3" name="Notes Placeholder 2">
+            <a:extLst>
+              <a:ext uri="{FF2B5EF4-FFF2-40B4-BE49-F238E27FC236}">
+                <a16:creationId xmlns:a16="http://schemas.microsoft.com/office/drawing/2014/main" id="{7160FA7D-F8BB-C989-7ABA-8622FAD327B7}"/>
+              </a:ext>
+            </a:extLst>
+          </p:cNvPr>
+          <p:cNvSpPr>
+            <a:spLocks noGrp="1"/>
+          </p:cNvSpPr>
+          <p:nvPr>
+            <p:ph type="body" idx="1"/>
+          </p:nvPr>
+        </p:nvSpPr>
+        <p:spPr/>
+        <p:txBody>
+          <a:bodyPr/>
+          <a:lstStyle/>
+          <a:p>
+            <a:r>
+              <a:rPr lang="de-DE"/>
+              <a:t>Neben den funktionalen Aspekten muss unser System auch </a:t>
+            </a:r>
+            <a:r>
+              <a:rPr lang="de-DE" b="1"/>
+              <a:t>technische und leistungsbezogene Anforderungen</a:t>
+            </a:r>
+            <a:r>
+              <a:rPr lang="de-DE"/>
+              <a:t> erfüllen, um ein reibungsloses und sicheres Spielerlebnis zu garantieren:</a:t>
+            </a:r>
+          </a:p>
+          <a:p>
+            <a:r>
+              <a:rPr lang="de-DE"/>
+              <a:t>🚀 </a:t>
+            </a:r>
+            <a:r>
+              <a:rPr lang="de-DE" b="1"/>
+              <a:t>Smooth Performance – 30 FPS </a:t>
+            </a:r>
+            <a:r>
+              <a:rPr lang="de-DE" b="1" err="1"/>
+              <a:t>Stability</a:t>
+            </a:r>
+            <a:br>
+              <a:rPr lang="de-DE"/>
+            </a:br>
+            <a:r>
+              <a:rPr lang="de-DE"/>
+              <a:t>Unser Spiel ist für </a:t>
+            </a:r>
+            <a:r>
+              <a:rPr lang="de-DE" b="1"/>
+              <a:t>flüssige 30 FPS</a:t>
+            </a:r>
+            <a:r>
+              <a:rPr lang="de-DE"/>
+              <a:t> optimiert, um ein konsistentes und reaktionsschnelles Spielerlebnis zu gewährleisten.</a:t>
+            </a:r>
+          </a:p>
+          <a:p>
+            <a:r>
+              <a:rPr lang="de-DE"/>
+              <a:t>📈 </a:t>
+            </a:r>
+            <a:r>
+              <a:rPr lang="de-DE" b="1" err="1"/>
+              <a:t>Scalability</a:t>
+            </a:r>
+            <a:r>
+              <a:rPr lang="de-DE" b="1"/>
+              <a:t> </a:t>
+            </a:r>
+            <a:r>
+              <a:rPr lang="de-DE" b="1" err="1"/>
+              <a:t>for</a:t>
+            </a:r>
+            <a:r>
+              <a:rPr lang="de-DE" b="1"/>
+              <a:t> Multiple Sessions</a:t>
+            </a:r>
+            <a:br>
+              <a:rPr lang="de-DE"/>
+            </a:br>
+            <a:r>
+              <a:rPr lang="de-DE"/>
+              <a:t>Die Server-Architektur ermöglicht </a:t>
+            </a:r>
+            <a:r>
+              <a:rPr lang="de-DE" b="1"/>
+              <a:t>gleichzeitige Spiele</a:t>
+            </a:r>
+            <a:r>
+              <a:rPr lang="de-DE"/>
+              <a:t> und eine effiziente Ressourcennutzung, um mehrere Spielsessions parallel zu verwalten.</a:t>
+            </a:r>
+          </a:p>
+          <a:p>
+            <a:r>
+              <a:rPr lang="de-DE"/>
+              <a:t>🔒 </a:t>
+            </a:r>
+            <a:r>
+              <a:rPr lang="de-DE" b="1"/>
+              <a:t>Secure Authentication &amp; </a:t>
+            </a:r>
+            <a:r>
+              <a:rPr lang="de-DE" b="1" err="1"/>
+              <a:t>Encrypted</a:t>
+            </a:r>
+            <a:r>
+              <a:rPr lang="de-DE" b="1"/>
+              <a:t> Communication</a:t>
+            </a:r>
+            <a:br>
+              <a:rPr lang="de-DE"/>
+            </a:br>
+            <a:r>
+              <a:rPr lang="de-DE"/>
+              <a:t>Spielerdaten und Kommunikation sind durch </a:t>
+            </a:r>
+            <a:r>
+              <a:rPr lang="de-DE" b="1"/>
+              <a:t>verschlüsselte Authentifizierung und gesicherte Netzwerkverbindungen</a:t>
+            </a:r>
+            <a:r>
+              <a:rPr lang="de-DE"/>
+              <a:t> geschützt, um Datenschutz und Sicherheit zu gewährleisten.</a:t>
+            </a:r>
+          </a:p>
+          <a:p>
+            <a:r>
+              <a:rPr lang="de-DE"/>
+              <a:t>🎯 </a:t>
+            </a:r>
+            <a:r>
+              <a:rPr lang="de-DE" b="1" err="1"/>
+              <a:t>Accurate</a:t>
+            </a:r>
+            <a:r>
+              <a:rPr lang="de-DE" b="1"/>
+              <a:t> </a:t>
+            </a:r>
+            <a:r>
+              <a:rPr lang="de-DE" b="1" err="1"/>
+              <a:t>Collision</a:t>
+            </a:r>
+            <a:r>
+              <a:rPr lang="de-DE" b="1"/>
+              <a:t> </a:t>
+            </a:r>
+            <a:r>
+              <a:rPr lang="de-DE" b="1" err="1"/>
+              <a:t>Detection</a:t>
+            </a:r>
+            <a:br>
+              <a:rPr lang="de-DE"/>
+            </a:br>
+            <a:r>
+              <a:rPr lang="de-DE"/>
+              <a:t>Eine präzise </a:t>
+            </a:r>
+            <a:r>
+              <a:rPr lang="de-DE" b="1"/>
+              <a:t>Kollisionserkennung</a:t>
+            </a:r>
+            <a:r>
+              <a:rPr lang="de-DE"/>
+              <a:t> sorgt für realistische Interaktionen zwischen Charakteren, Hindernissen und der Umgebung.</a:t>
+            </a:r>
+          </a:p>
+          <a:p>
+            <a:r>
+              <a:rPr lang="de-DE"/>
+              <a:t>🖥 </a:t>
+            </a:r>
+            <a:r>
+              <a:rPr lang="de-DE" b="1" err="1"/>
+              <a:t>Optimized</a:t>
+            </a:r>
+            <a:r>
+              <a:rPr lang="de-DE" b="1"/>
+              <a:t> </a:t>
+            </a:r>
+            <a:r>
+              <a:rPr lang="de-DE" b="1" err="1"/>
+              <a:t>for</a:t>
+            </a:r>
+            <a:r>
+              <a:rPr lang="de-DE" b="1"/>
+              <a:t> Standard Hardware</a:t>
+            </a:r>
+            <a:br>
+              <a:rPr lang="de-DE"/>
+            </a:br>
+            <a:r>
+              <a:rPr lang="de-DE"/>
+              <a:t>Das Spiel ist so konzipiert, dass es auf </a:t>
+            </a:r>
+            <a:r>
+              <a:rPr lang="de-DE" b="1"/>
+              <a:t>gängigen Endgeräten</a:t>
+            </a:r>
+            <a:r>
+              <a:rPr lang="de-DE"/>
+              <a:t> problemlos läuft, ohne spezielle Hardware-Anforderungen.</a:t>
+            </a:r>
+          </a:p>
+          <a:p>
+            <a:r>
+              <a:rPr lang="de-DE"/>
+              <a:t>🌐 </a:t>
+            </a:r>
+            <a:r>
+              <a:rPr lang="de-DE" b="1" err="1"/>
+              <a:t>Stable</a:t>
+            </a:r>
+            <a:r>
+              <a:rPr lang="de-DE" b="1"/>
+              <a:t> Network Connection </a:t>
+            </a:r>
+            <a:r>
+              <a:rPr lang="de-DE" b="1" err="1"/>
+              <a:t>Assumption</a:t>
+            </a:r>
+            <a:br>
+              <a:rPr lang="de-DE"/>
+            </a:br>
+            <a:r>
+              <a:rPr lang="de-DE"/>
+              <a:t>Für eine zuverlässige Performance setzen wir eine </a:t>
+            </a:r>
+            <a:r>
+              <a:rPr lang="de-DE" b="1"/>
+              <a:t>stabile Internetverbindung</a:t>
+            </a:r>
+            <a:r>
+              <a:rPr lang="de-DE"/>
+              <a:t> voraus, insbesondere innerhalb des </a:t>
+            </a:r>
+            <a:r>
+              <a:rPr lang="de-DE" b="1"/>
+              <a:t>universitären Netzwerks</a:t>
+            </a:r>
+            <a:r>
+              <a:rPr lang="de-DE"/>
+              <a:t>.</a:t>
+            </a:r>
+          </a:p>
+          <a:p>
+            <a:r>
+              <a:rPr lang="de-DE"/>
+              <a:t>Diese Anforderungen stellen sicher, dass </a:t>
+            </a:r>
+            <a:r>
+              <a:rPr lang="de-DE" b="1"/>
+              <a:t>Escape Room Game</a:t>
+            </a:r>
+            <a:r>
+              <a:rPr lang="de-DE"/>
+              <a:t> nicht nur technisch funktioniert, sondern auch ein </a:t>
+            </a:r>
+            <a:r>
+              <a:rPr lang="de-DE" b="1"/>
+              <a:t>stabiles, sicheres und zugängliches Spielerlebnis</a:t>
+            </a:r>
+            <a:r>
+              <a:rPr lang="de-DE"/>
+              <a:t> bietet.</a:t>
+            </a:r>
+          </a:p>
+          <a:p>
+            <a:br>
+              <a:rPr lang="de-CH">
+                <a:cs typeface="+mn-lt"/>
+              </a:rPr>
+            </a:br>
+            <a:endParaRPr lang="de-CH"/>
+          </a:p>
+        </p:txBody>
+      </p:sp>
+      <p:sp>
+        <p:nvSpPr>
+          <p:cNvPr id="4" name="Slide Number Placeholder 3">
+            <a:extLst>
+              <a:ext uri="{FF2B5EF4-FFF2-40B4-BE49-F238E27FC236}">
+                <a16:creationId xmlns:a16="http://schemas.microsoft.com/office/drawing/2014/main" id="{9E41B5A9-8FBC-4CFF-E2A2-EBDDDDCDCDD6}"/>
+              </a:ext>
+            </a:extLst>
+          </p:cNvPr>
+          <p:cNvSpPr>
+            <a:spLocks noGrp="1"/>
+          </p:cNvSpPr>
+          <p:nvPr>
+            <p:ph type="sldNum" sz="quarter" idx="5"/>
+          </p:nvPr>
+        </p:nvSpPr>
+        <p:spPr/>
+        <p:txBody>
+          <a:bodyPr/>
+          <a:lstStyle/>
+          <a:p>
+            <a:fld id="{D3601A89-DBFB-4F6A-83EE-ADE86D57FE12}" type="slidenum">
+              <a:rPr lang="de-CH" smtClean="0"/>
+              <a:t>9</a:t>
+            </a:fld>
+            <a:endParaRPr lang="de-CH"/>
+          </a:p>
+        </p:txBody>
+      </p:sp>
+    </p:spTree>
+    <p:extLst>
+      <p:ext uri="{BB962C8B-B14F-4D97-AF65-F5344CB8AC3E}">
+        <p14:creationId xmlns:p14="http://schemas.microsoft.com/office/powerpoint/2010/main" val="3807248152"/>
+      </p:ext>
+    </p:extLst>
+  </p:cSld>
+  <p:clrMapOvr>
+    <a:masterClrMapping/>
+  </p:clrMapOvr>
+</p:notes>
+</file>
+
+<file path=ppt/notesSlides/notesSlide9.xml><?xml version="1.0" encoding="utf-8"?>
 <p:notes xmlns:a="http://schemas.openxmlformats.org/drawingml/2006/main" xmlns:r="http://schemas.openxmlformats.org/officeDocument/2006/relationships" xmlns:p="http://schemas.openxmlformats.org/presentationml/2006/main">
   <p:cSld>
     <p:spTree>
@@ -1779,7 +2432,7 @@
           <a:bodyPr/>
           <a:lstStyle/>
           <a:p>
-            <a:endParaRPr lang="de-CH"/>
+            <a:endParaRPr lang="en-GB"/>
           </a:p>
         </p:txBody>
       </p:sp>
@@ -1800,7 +2453,7 @@
           <a:p>
             <a:fld id="{D3601A89-DBFB-4F6A-83EE-ADE86D57FE12}" type="slidenum">
               <a:rPr lang="de-CH" smtClean="0"/>
-              <a:t>13</a:t>
+              <a:t>10</a:t>
             </a:fld>
             <a:endParaRPr lang="de-CH"/>
           </a:p>
@@ -1809,7 +2462,7 @@
     </p:spTree>
     <p:extLst>
       <p:ext uri="{BB962C8B-B14F-4D97-AF65-F5344CB8AC3E}">
-        <p14:creationId xmlns:p14="http://schemas.microsoft.com/office/powerpoint/2010/main" val="813683188"/>
+        <p14:creationId xmlns:p14="http://schemas.microsoft.com/office/powerpoint/2010/main" val="2866445731"/>
       </p:ext>
     </p:extLst>
   </p:cSld>
@@ -1968,7 +2621,7 @@
           <a:p>
             <a:fld id="{98DF94B5-1319-41D7-9002-A4F9A997663F}" type="datetimeFigureOut">
               <a:rPr lang="de-CH" smtClean="0"/>
-              <a:t>05.03.2025</a:t>
+              <a:t>06.03.2025</a:t>
             </a:fld>
             <a:endParaRPr lang="de-CH"/>
           </a:p>
@@ -2168,7 +2821,7 @@
           <a:p>
             <a:fld id="{98DF94B5-1319-41D7-9002-A4F9A997663F}" type="datetimeFigureOut">
               <a:rPr lang="de-CH" smtClean="0"/>
-              <a:t>05.03.2025</a:t>
+              <a:t>06.03.2025</a:t>
             </a:fld>
             <a:endParaRPr lang="de-CH"/>
           </a:p>
@@ -2378,7 +3031,7 @@
           <a:p>
             <a:fld id="{98DF94B5-1319-41D7-9002-A4F9A997663F}" type="datetimeFigureOut">
               <a:rPr lang="de-CH" smtClean="0"/>
-              <a:t>05.03.2025</a:t>
+              <a:t>06.03.2025</a:t>
             </a:fld>
             <a:endParaRPr lang="de-CH"/>
           </a:p>
@@ -2578,7 +3231,7 @@
           <a:p>
             <a:fld id="{98DF94B5-1319-41D7-9002-A4F9A997663F}" type="datetimeFigureOut">
               <a:rPr lang="de-CH" smtClean="0"/>
-              <a:t>05.03.2025</a:t>
+              <a:t>06.03.2025</a:t>
             </a:fld>
             <a:endParaRPr lang="de-CH"/>
           </a:p>
@@ -2854,7 +3507,7 @@
           <a:p>
             <a:fld id="{98DF94B5-1319-41D7-9002-A4F9A997663F}" type="datetimeFigureOut">
               <a:rPr lang="de-CH" smtClean="0"/>
-              <a:t>05.03.2025</a:t>
+              <a:t>06.03.2025</a:t>
             </a:fld>
             <a:endParaRPr lang="de-CH"/>
           </a:p>
@@ -3122,7 +3775,7 @@
           <a:p>
             <a:fld id="{98DF94B5-1319-41D7-9002-A4F9A997663F}" type="datetimeFigureOut">
               <a:rPr lang="de-CH" smtClean="0"/>
-              <a:t>05.03.2025</a:t>
+              <a:t>06.03.2025</a:t>
             </a:fld>
             <a:endParaRPr lang="de-CH"/>
           </a:p>
@@ -3537,7 +4190,7 @@
           <a:p>
             <a:fld id="{98DF94B5-1319-41D7-9002-A4F9A997663F}" type="datetimeFigureOut">
               <a:rPr lang="de-CH" smtClean="0"/>
-              <a:t>05.03.2025</a:t>
+              <a:t>06.03.2025</a:t>
             </a:fld>
             <a:endParaRPr lang="de-CH"/>
           </a:p>
@@ -3679,7 +4332,7 @@
           <a:p>
             <a:fld id="{98DF94B5-1319-41D7-9002-A4F9A997663F}" type="datetimeFigureOut">
               <a:rPr lang="de-CH" smtClean="0"/>
-              <a:t>05.03.2025</a:t>
+              <a:t>06.03.2025</a:t>
             </a:fld>
             <a:endParaRPr lang="de-CH"/>
           </a:p>
@@ -3792,7 +4445,7 @@
           <a:p>
             <a:fld id="{98DF94B5-1319-41D7-9002-A4F9A997663F}" type="datetimeFigureOut">
               <a:rPr lang="de-CH" smtClean="0"/>
-              <a:t>05.03.2025</a:t>
+              <a:t>06.03.2025</a:t>
             </a:fld>
             <a:endParaRPr lang="de-CH"/>
           </a:p>
@@ -4105,7 +4758,7 @@
           <a:p>
             <a:fld id="{98DF94B5-1319-41D7-9002-A4F9A997663F}" type="datetimeFigureOut">
               <a:rPr lang="de-CH" smtClean="0"/>
-              <a:t>05.03.2025</a:t>
+              <a:t>06.03.2025</a:t>
             </a:fld>
             <a:endParaRPr lang="de-CH"/>
           </a:p>
@@ -4394,7 +5047,7 @@
           <a:p>
             <a:fld id="{98DF94B5-1319-41D7-9002-A4F9A997663F}" type="datetimeFigureOut">
               <a:rPr lang="de-CH" smtClean="0"/>
-              <a:t>05.03.2025</a:t>
+              <a:t>06.03.2025</a:t>
             </a:fld>
             <a:endParaRPr lang="de-CH"/>
           </a:p>
@@ -4643,7 +5296,7 @@
           <a:p>
             <a:fld id="{98DF94B5-1319-41D7-9002-A4F9A997663F}" type="datetimeFigureOut">
               <a:rPr lang="de-CH" smtClean="0"/>
-              <a:t>05.03.2025</a:t>
+              <a:t>06.03.2025</a:t>
             </a:fld>
             <a:endParaRPr lang="de-CH"/>
           </a:p>
@@ -5146,7 +5799,7 @@
           <p:nvPr/>
         </p:nvPicPr>
         <p:blipFill>
-          <a:blip r:embed="rId2">
+          <a:blip r:embed="rId3">
             <a:alphaModFix amt="50000"/>
           </a:blip>
           <a:srcRect l="3676" r="8768" b="-1"/>
@@ -12853,7 +13506,7 @@
           <p:nvPr/>
         </p:nvPicPr>
         <p:blipFill>
-          <a:blip r:embed="rId2"/>
+          <a:blip r:embed="rId3"/>
           <a:srcRect l="8166" t="21107" r="68585" b="64540"/>
           <a:stretch/>
         </p:blipFill>
@@ -12882,7 +13535,7 @@
           <p:nvPr/>
         </p:nvPicPr>
         <p:blipFill>
-          <a:blip r:embed="rId3"/>
+          <a:blip r:embed="rId4"/>
           <a:srcRect l="8299" t="3860" r="82959" b="69502"/>
           <a:stretch/>
         </p:blipFill>
@@ -12991,7 +13644,7 @@
           <a:p>
             <a:pPr>
               <a:buBlip>
-                <a:blip r:embed="rId4"/>
+                <a:blip r:embed="rId5"/>
               </a:buBlip>
             </a:pPr>
             <a:r>
@@ -13067,7 +13720,7 @@
           <a:p>
             <a:pPr>
               <a:buBlip>
-                <a:blip r:embed="rId4"/>
+                <a:blip r:embed="rId5"/>
               </a:buBlip>
             </a:pPr>
             <a:r>
@@ -13098,7 +13751,7 @@
           <a:p>
             <a:pPr>
               <a:buBlip>
-                <a:blip r:embed="rId4"/>
+                <a:blip r:embed="rId5"/>
               </a:buBlip>
             </a:pPr>
             <a:r>
@@ -13114,7 +13767,7 @@
           <a:p>
             <a:pPr lvl="2">
               <a:buBlip>
-                <a:blip r:embed="rId4"/>
+                <a:blip r:embed="rId5"/>
               </a:buBlip>
             </a:pPr>
             <a:r>
@@ -13132,7 +13785,7 @@
           <a:p>
             <a:pPr lvl="2">
               <a:buBlip>
-                <a:blip r:embed="rId4"/>
+                <a:blip r:embed="rId5"/>
               </a:buBlip>
             </a:pPr>
             <a:r>
@@ -13161,7 +13814,7 @@
           <a:p>
             <a:pPr lvl="2">
               <a:buBlip>
-                <a:blip r:embed="rId4"/>
+                <a:blip r:embed="rId5"/>
               </a:buBlip>
             </a:pPr>
             <a:r>
@@ -13326,7 +13979,7 @@
           <p:nvPr/>
         </p:nvPicPr>
         <p:blipFill>
-          <a:blip r:embed="rId2"/>
+          <a:blip r:embed="rId3"/>
           <a:srcRect l="8166" t="21107" r="68585" b="64540"/>
           <a:stretch/>
         </p:blipFill>
@@ -13355,7 +14008,7 @@
           <p:nvPr/>
         </p:nvPicPr>
         <p:blipFill>
-          <a:blip r:embed="rId3"/>
+          <a:blip r:embed="rId4"/>
           <a:srcRect l="8299" t="3860" r="82959" b="69502"/>
           <a:stretch/>
         </p:blipFill>
@@ -13452,7 +14105,7 @@
           <a:p>
             <a:pPr marL="342900" indent="-342900">
               <a:buBlip>
-                <a:blip r:embed="rId4"/>
+                <a:blip r:embed="rId5"/>
               </a:buBlip>
             </a:pPr>
             <a:r>
@@ -13481,7 +14134,7 @@
           <a:p>
             <a:pPr marL="342900" indent="-342900">
               <a:buBlip>
-                <a:blip r:embed="rId4"/>
+                <a:blip r:embed="rId5"/>
               </a:buBlip>
             </a:pPr>
             <a:r>
@@ -13600,7 +14253,7 @@
           <a:p>
             <a:pPr marL="342900" indent="-342900">
               <a:buBlip>
-                <a:blip r:embed="rId4"/>
+                <a:blip r:embed="rId5"/>
               </a:buBlip>
             </a:pPr>
             <a:r>
@@ -13618,7 +14271,7 @@
           <a:p>
             <a:pPr marL="342900" indent="-342900">
               <a:buBlip>
-                <a:blip r:embed="rId4"/>
+                <a:blip r:embed="rId5"/>
               </a:buBlip>
             </a:pPr>
             <a:r>
@@ -13708,7 +14361,7 @@
           </p:nvPr>
         </p:nvPicPr>
         <p:blipFill>
-          <a:blip r:embed="rId5"/>
+          <a:blip r:embed="rId6"/>
           <a:srcRect l="3522" t="34586" r="75872" b="38376"/>
           <a:stretch/>
         </p:blipFill>
@@ -13734,7 +14387,7 @@
           <p:nvPr/>
         </p:nvPicPr>
         <p:blipFill>
-          <a:blip r:embed="rId3"/>
+          <a:blip r:embed="rId4"/>
           <a:srcRect l="54" r="71946" b="66199"/>
           <a:stretch/>
         </p:blipFill>
@@ -13763,7 +14416,7 @@
           <p:nvPr/>
         </p:nvPicPr>
         <p:blipFill>
-          <a:blip r:embed="rId2"/>
+          <a:blip r:embed="rId3"/>
           <a:srcRect t="45" r="67223" b="60470"/>
           <a:stretch/>
         </p:blipFill>
@@ -13792,7 +14445,7 @@
           <p:nvPr/>
         </p:nvPicPr>
         <p:blipFill>
-          <a:blip r:embed="rId6"/>
+          <a:blip r:embed="rId7"/>
           <a:srcRect l="-93" t="-185" r="79536" b="41882"/>
           <a:stretch/>
         </p:blipFill>

</xml_diff>